<commit_message>
versão final apresentação / roteiro
</commit_message>
<xml_diff>
--- a/apresentacao/ituran-seguro-bike-final.pptx
+++ b/apresentacao/ituran-seguro-bike-final.pptx
@@ -5,7 +5,7 @@
     <p:sldMasterId id="2147483648" r:id="rId1"/>
   </p:sldMasterIdLst>
   <p:notesMasterIdLst>
-    <p:notesMasterId r:id="rId16"/>
+    <p:notesMasterId r:id="rId18"/>
   </p:notesMasterIdLst>
   <p:sldIdLst>
     <p:sldId id="257" r:id="rId2"/>
@@ -16,12 +16,14 @@
     <p:sldId id="270" r:id="rId7"/>
     <p:sldId id="273" r:id="rId8"/>
     <p:sldId id="262" r:id="rId9"/>
-    <p:sldId id="267" r:id="rId10"/>
-    <p:sldId id="263" r:id="rId11"/>
-    <p:sldId id="260" r:id="rId12"/>
-    <p:sldId id="272" r:id="rId13"/>
-    <p:sldId id="268" r:id="rId14"/>
-    <p:sldId id="269" r:id="rId15"/>
+    <p:sldId id="276" r:id="rId10"/>
+    <p:sldId id="275" r:id="rId11"/>
+    <p:sldId id="267" r:id="rId12"/>
+    <p:sldId id="263" r:id="rId13"/>
+    <p:sldId id="260" r:id="rId14"/>
+    <p:sldId id="272" r:id="rId15"/>
+    <p:sldId id="268" r:id="rId16"/>
+    <p:sldId id="269" r:id="rId17"/>
   </p:sldIdLst>
   <p:sldSz cx="12192000" cy="6858000"/>
   <p:notesSz cx="6858000" cy="9144000"/>
@@ -222,7 +224,7 @@
           <a:p>
             <a:fld id="{2CCF31F5-1638-40C3-A940-91DAB2405771}" type="datetimeFigureOut">
               <a:rPr lang="pt-BR" smtClean="0"/>
-              <a:t>28/10/2019</a:t>
+              <a:t>29/10/2019</a:t>
             </a:fld>
             <a:endParaRPr lang="pt-BR"/>
           </a:p>
@@ -558,7 +560,7 @@
                 <a:ea typeface="+mn-ea"/>
                 <a:cs typeface="+mn-cs"/>
               </a:rPr>
-              <a:t>Grupo da ideia </a:t>
+              <a:t>Nós somos o grupo da grande ideia </a:t>
             </a:r>
             <a:r>
               <a:rPr lang="pt-BR" sz="1200" kern="1200" dirty="0" err="1" smtClean="0">
@@ -636,6 +638,15 @@
               </a:rPr>
               <a:t>A nossa proposta é a criação e viabilização de um produto de rastreamento, com ou sem seguro, para bicicletas.</a:t>
             </a:r>
+            <a:endParaRPr lang="pt-BR" sz="1200" kern="1200" dirty="0">
+              <a:solidFill>
+                <a:schemeClr val="tx1"/>
+              </a:solidFill>
+              <a:effectLst/>
+              <a:latin typeface="+mn-lt"/>
+              <a:ea typeface="+mn-ea"/>
+              <a:cs typeface="+mn-cs"/>
+            </a:endParaRPr>
           </a:p>
         </p:txBody>
       </p:sp>
@@ -729,7 +740,7 @@
                 <a:ea typeface="+mn-ea"/>
                 <a:cs typeface="+mn-cs"/>
               </a:rPr>
-              <a:t>Slide 10 - Quanto</a:t>
+              <a:t>Slide 10 - Como</a:t>
             </a:r>
           </a:p>
           <a:p>
@@ -743,12 +754,10 @@
                 <a:ea typeface="+mn-ea"/>
                 <a:cs typeface="+mn-cs"/>
               </a:rPr>
-              <a:t>Os custos estimados para a implementação da ideia envolvem o seguinte:</a:t>
-            </a:r>
-          </a:p>
-          <a:p>
-            <a:r>
-              <a:rPr lang="pt-BR" sz="1200" kern="1200" dirty="0" smtClean="0">
+              <a:t>Considerando um mercado de aproximadamente trinta mil seguros de bicicleta por ano, achamos pertinente, também, levantar parcerias para atuar no modelo atual de “</a:t>
+            </a:r>
+            <a:r>
+              <a:rPr lang="pt-BR" sz="1200" kern="1200" dirty="0" err="1" smtClean="0">
                 <a:solidFill>
                   <a:schemeClr val="tx1"/>
                 </a:solidFill>
@@ -757,10 +766,8 @@
                 <a:ea typeface="+mn-ea"/>
                 <a:cs typeface="+mn-cs"/>
               </a:rPr>
-              <a:t>O redesenho da placa de circuito do rastreador para caber em uma bicicleta; envolve a área técnica e necessita de um engenheiro eletrônico.</a:t>
-            </a:r>
-          </a:p>
-          <a:p>
+              <a:t>Ituran</a:t>
+            </a:r>
             <a:r>
               <a:rPr lang="pt-BR" sz="1200" kern="1200" dirty="0" smtClean="0">
                 <a:solidFill>
@@ -771,12 +778,10 @@
                 <a:ea typeface="+mn-ea"/>
                 <a:cs typeface="+mn-cs"/>
               </a:rPr>
-              <a:t>O desenvolvimento do portal de integração com as seguradoras – no formato do portal e-commerce atual; envolve a área de TI.</a:t>
-            </a:r>
-          </a:p>
-          <a:p>
-            <a:r>
-              <a:rPr lang="pt-BR" sz="1200" kern="1200" dirty="0" smtClean="0">
+              <a:t> com seguro”, e temos contatos avançados com estes dois importantes players da área de seguro para </a:t>
+            </a:r>
+            <a:r>
+              <a:rPr lang="pt-BR" sz="1200" kern="1200" dirty="0" err="1" smtClean="0">
                 <a:solidFill>
                   <a:schemeClr val="tx1"/>
                 </a:solidFill>
@@ -785,10 +790,8 @@
                 <a:ea typeface="+mn-ea"/>
                 <a:cs typeface="+mn-cs"/>
               </a:rPr>
-              <a:t>O planejamento de marketing; envolvendo a própria.</a:t>
-            </a:r>
-          </a:p>
-          <a:p>
+              <a:t>bikes</a:t>
+            </a:r>
             <a:r>
               <a:rPr lang="pt-BR" sz="1200" kern="1200" dirty="0" smtClean="0">
                 <a:solidFill>
@@ -799,7 +802,131 @@
                 <a:ea typeface="+mn-ea"/>
                 <a:cs typeface="+mn-cs"/>
               </a:rPr>
-              <a:t>O treinamento para as áreas envolvidas e parceiros que instalarão os kits.</a:t>
+              <a:t>. A </a:t>
+            </a:r>
+            <a:r>
+              <a:rPr lang="pt-BR" sz="1200" kern="1200" dirty="0" err="1" smtClean="0">
+                <a:solidFill>
+                  <a:schemeClr val="tx1"/>
+                </a:solidFill>
+                <a:effectLst/>
+                <a:latin typeface="+mn-lt"/>
+                <a:ea typeface="+mn-ea"/>
+                <a:cs typeface="+mn-cs"/>
+              </a:rPr>
+              <a:t>véloSeguro</a:t>
+            </a:r>
+            <a:r>
+              <a:rPr lang="pt-BR" sz="1200" kern="1200" dirty="0" smtClean="0">
+                <a:solidFill>
+                  <a:schemeClr val="tx1"/>
+                </a:solidFill>
+                <a:effectLst/>
+                <a:latin typeface="+mn-lt"/>
+                <a:ea typeface="+mn-ea"/>
+                <a:cs typeface="+mn-cs"/>
+              </a:rPr>
+              <a:t> e a </a:t>
+            </a:r>
+            <a:r>
+              <a:rPr lang="pt-BR" sz="1200" kern="1200" dirty="0" err="1" smtClean="0">
+                <a:solidFill>
+                  <a:schemeClr val="tx1"/>
+                </a:solidFill>
+                <a:effectLst/>
+                <a:latin typeface="+mn-lt"/>
+                <a:ea typeface="+mn-ea"/>
+                <a:cs typeface="+mn-cs"/>
+              </a:rPr>
+              <a:t>kakau</a:t>
+            </a:r>
+            <a:r>
+              <a:rPr lang="pt-BR" sz="1200" kern="1200" dirty="0" smtClean="0">
+                <a:solidFill>
+                  <a:schemeClr val="tx1"/>
+                </a:solidFill>
+                <a:effectLst/>
+                <a:latin typeface="+mn-lt"/>
+                <a:ea typeface="+mn-ea"/>
+                <a:cs typeface="+mn-cs"/>
+              </a:rPr>
+              <a:t>, ambas focadas principalmente em seguro de bicicletas.</a:t>
+            </a:r>
+          </a:p>
+          <a:p>
+            <a:r>
+              <a:rPr lang="pt-BR" sz="1200" kern="1200" dirty="0" smtClean="0">
+                <a:solidFill>
+                  <a:schemeClr val="tx1"/>
+                </a:solidFill>
+                <a:effectLst/>
+                <a:latin typeface="+mn-lt"/>
+                <a:ea typeface="+mn-ea"/>
+                <a:cs typeface="+mn-cs"/>
+              </a:rPr>
+              <a:t>A </a:t>
+            </a:r>
+            <a:r>
+              <a:rPr lang="pt-BR" sz="1200" kern="1200" dirty="0" err="1" smtClean="0">
+                <a:solidFill>
+                  <a:schemeClr val="tx1"/>
+                </a:solidFill>
+                <a:effectLst/>
+                <a:latin typeface="+mn-lt"/>
+                <a:ea typeface="+mn-ea"/>
+                <a:cs typeface="+mn-cs"/>
+              </a:rPr>
+              <a:t>Vélo</a:t>
+            </a:r>
+            <a:r>
+              <a:rPr lang="pt-BR" sz="1200" kern="1200" dirty="0" smtClean="0">
+                <a:solidFill>
+                  <a:schemeClr val="tx1"/>
+                </a:solidFill>
+                <a:effectLst/>
+                <a:latin typeface="+mn-lt"/>
+                <a:ea typeface="+mn-ea"/>
+                <a:cs typeface="+mn-cs"/>
+              </a:rPr>
+              <a:t>, por exemplo, nasceu em 2015, tem seiscentos acessos por dia no site e uma média de trezentas novas apólices por mês. </a:t>
+            </a:r>
+          </a:p>
+          <a:p>
+            <a:r>
+              <a:rPr lang="pt-BR" sz="1200" kern="1200" dirty="0" smtClean="0">
+                <a:solidFill>
+                  <a:schemeClr val="tx1"/>
+                </a:solidFill>
+                <a:effectLst/>
+                <a:latin typeface="+mn-lt"/>
+                <a:ea typeface="+mn-ea"/>
+                <a:cs typeface="+mn-cs"/>
+              </a:rPr>
+              <a:t>Já a </a:t>
+            </a:r>
+            <a:r>
+              <a:rPr lang="pt-BR" sz="1200" kern="1200" dirty="0" err="1" smtClean="0">
+                <a:solidFill>
+                  <a:schemeClr val="tx1"/>
+                </a:solidFill>
+                <a:effectLst/>
+                <a:latin typeface="+mn-lt"/>
+                <a:ea typeface="+mn-ea"/>
+                <a:cs typeface="+mn-cs"/>
+              </a:rPr>
+              <a:t>Kakau</a:t>
+            </a:r>
+            <a:r>
+              <a:rPr lang="pt-BR" sz="1200" kern="1200" dirty="0" smtClean="0">
+                <a:solidFill>
+                  <a:schemeClr val="tx1"/>
+                </a:solidFill>
+                <a:effectLst/>
+                <a:latin typeface="+mn-lt"/>
+                <a:ea typeface="+mn-ea"/>
+                <a:cs typeface="+mn-cs"/>
+              </a:rPr>
+              <a:t> ainda não tem dados consolidados, pois está se lançando neste mercado.</a:t>
             </a:r>
           </a:p>
           <a:p>
@@ -833,7 +960,7 @@
     </p:spTree>
     <p:extLst>
       <p:ext uri="{BB962C8B-B14F-4D97-AF65-F5344CB8AC3E}">
-        <p14:creationId xmlns:p14="http://schemas.microsoft.com/office/powerpoint/2010/main" val="2609330044"/>
+        <p14:creationId xmlns:p14="http://schemas.microsoft.com/office/powerpoint/2010/main" val="2464363901"/>
       </p:ext>
     </p:extLst>
   </p:cSld>
@@ -897,10 +1024,12 @@
                 <a:ea typeface="+mn-ea"/>
                 <a:cs typeface="+mn-cs"/>
               </a:rPr>
-              <a:t>Slide 11 </a:t>
-            </a:r>
-            <a:r>
-              <a:rPr lang="pt-BR" sz="1200" b="1" kern="1200" dirty="0" err="1" smtClean="0">
+              <a:t>Slide 11 - Como</a:t>
+            </a:r>
+          </a:p>
+          <a:p>
+            <a:r>
+              <a:rPr lang="pt-BR" sz="1200" kern="1200" dirty="0" smtClean="0">
                 <a:solidFill>
                   <a:schemeClr val="tx1"/>
                 </a:solidFill>
@@ -909,9 +1038,123 @@
                 <a:ea typeface="+mn-ea"/>
                 <a:cs typeface="+mn-cs"/>
               </a:rPr>
-              <a:t>Por-quê</a:t>
-            </a:r>
-            <a:endParaRPr lang="pt-BR" sz="1200" b="1" kern="1200" dirty="0" smtClean="0">
+              <a:t>Consideramos que, se o projeto vier a ser implementado, os próximos passos planejados seriam os seguintes:</a:t>
+            </a:r>
+          </a:p>
+          <a:p>
+            <a:r>
+              <a:rPr lang="pt-BR" sz="1200" kern="1200" dirty="0" smtClean="0">
+                <a:solidFill>
+                  <a:schemeClr val="tx1"/>
+                </a:solidFill>
+                <a:effectLst/>
+                <a:latin typeface="+mn-lt"/>
+                <a:ea typeface="+mn-ea"/>
+                <a:cs typeface="+mn-cs"/>
+              </a:rPr>
+              <a:t>Definir o plano de marketing, se vai manter a campanha atual e ampliar para o </a:t>
+            </a:r>
+            <a:r>
+              <a:rPr lang="pt-BR" sz="1200" kern="1200" dirty="0" err="1" smtClean="0">
+                <a:solidFill>
+                  <a:schemeClr val="tx1"/>
+                </a:solidFill>
+                <a:effectLst/>
+                <a:latin typeface="+mn-lt"/>
+                <a:ea typeface="+mn-ea"/>
+                <a:cs typeface="+mn-cs"/>
+              </a:rPr>
+              <a:t>ituran</a:t>
+            </a:r>
+            <a:r>
+              <a:rPr lang="pt-BR" sz="1200" kern="1200" dirty="0" smtClean="0">
+                <a:solidFill>
+                  <a:schemeClr val="tx1"/>
+                </a:solidFill>
+                <a:effectLst/>
+                <a:latin typeface="+mn-lt"/>
+                <a:ea typeface="+mn-ea"/>
+                <a:cs typeface="+mn-cs"/>
+              </a:rPr>
+              <a:t> com seguro </a:t>
+            </a:r>
+            <a:r>
+              <a:rPr lang="pt-BR" sz="1200" kern="1200" dirty="0" err="1" smtClean="0">
+                <a:solidFill>
+                  <a:schemeClr val="tx1"/>
+                </a:solidFill>
+                <a:effectLst/>
+                <a:latin typeface="+mn-lt"/>
+                <a:ea typeface="+mn-ea"/>
+                <a:cs typeface="+mn-cs"/>
+              </a:rPr>
+              <a:t>bike</a:t>
+            </a:r>
+            <a:r>
+              <a:rPr lang="pt-BR" sz="1200" kern="1200" dirty="0" smtClean="0">
+                <a:solidFill>
+                  <a:schemeClr val="tx1"/>
+                </a:solidFill>
+                <a:effectLst/>
+                <a:latin typeface="+mn-lt"/>
+                <a:ea typeface="+mn-ea"/>
+                <a:cs typeface="+mn-cs"/>
+              </a:rPr>
+              <a:t>, definir mídia de veiculação, </a:t>
+            </a:r>
+            <a:r>
+              <a:rPr lang="pt-BR" sz="1200" kern="1200" dirty="0" err="1" smtClean="0">
+                <a:solidFill>
+                  <a:schemeClr val="tx1"/>
+                </a:solidFill>
+                <a:effectLst/>
+                <a:latin typeface="+mn-lt"/>
+                <a:ea typeface="+mn-ea"/>
+                <a:cs typeface="+mn-cs"/>
+              </a:rPr>
+              <a:t>etc</a:t>
+            </a:r>
+            <a:r>
+              <a:rPr lang="pt-BR" sz="1200" kern="1200" dirty="0" smtClean="0">
+                <a:solidFill>
+                  <a:schemeClr val="tx1"/>
+                </a:solidFill>
+                <a:effectLst/>
+                <a:latin typeface="+mn-lt"/>
+                <a:ea typeface="+mn-ea"/>
+                <a:cs typeface="+mn-cs"/>
+              </a:rPr>
+              <a:t>; </a:t>
+            </a:r>
+          </a:p>
+          <a:p>
+            <a:r>
+              <a:rPr lang="pt-BR" sz="1200" kern="1200" dirty="0" smtClean="0">
+                <a:solidFill>
+                  <a:schemeClr val="tx1"/>
+                </a:solidFill>
+                <a:effectLst/>
+                <a:latin typeface="+mn-lt"/>
+                <a:ea typeface="+mn-ea"/>
+                <a:cs typeface="+mn-cs"/>
+              </a:rPr>
+              <a:t>Redesenhar o rastreador para aceitar uma bicicleta como plataforma;</a:t>
+            </a:r>
+          </a:p>
+          <a:p>
+            <a:r>
+              <a:rPr lang="pt-BR" sz="1200" kern="1200" dirty="0" smtClean="0">
+                <a:solidFill>
+                  <a:schemeClr val="tx1"/>
+                </a:solidFill>
+                <a:effectLst/>
+                <a:latin typeface="+mn-lt"/>
+                <a:ea typeface="+mn-ea"/>
+                <a:cs typeface="+mn-cs"/>
+              </a:rPr>
+              <a:t>Fazer operações de testes para validar o rastreamento</a:t>
+            </a:r>
+            <a:endParaRPr lang="pt-BR" sz="1200" kern="1200" dirty="0">
               <a:solidFill>
                 <a:schemeClr val="tx1"/>
               </a:solidFill>
@@ -921,137 +1164,6 @@
               <a:cs typeface="+mn-cs"/>
             </a:endParaRPr>
           </a:p>
-          <a:p>
-            <a:r>
-              <a:rPr lang="pt-BR" sz="1200" kern="1200" dirty="0" smtClean="0">
-                <a:solidFill>
-                  <a:schemeClr val="tx1"/>
-                </a:solidFill>
-                <a:effectLst/>
-                <a:latin typeface="+mn-lt"/>
-                <a:ea typeface="+mn-ea"/>
-                <a:cs typeface="+mn-cs"/>
-              </a:rPr>
-              <a:t>Ao implementar a nossa ideia, esperamos como resultado criar um novo nicho de mercado para a </a:t>
-            </a:r>
-            <a:r>
-              <a:rPr lang="pt-BR" sz="1200" kern="1200" dirty="0" err="1" smtClean="0">
-                <a:solidFill>
-                  <a:schemeClr val="tx1"/>
-                </a:solidFill>
-                <a:effectLst/>
-                <a:latin typeface="+mn-lt"/>
-                <a:ea typeface="+mn-ea"/>
-                <a:cs typeface="+mn-cs"/>
-              </a:rPr>
-              <a:t>Ituran</a:t>
-            </a:r>
-            <a:r>
-              <a:rPr lang="pt-BR" sz="1200" kern="1200" dirty="0" smtClean="0">
-                <a:solidFill>
-                  <a:schemeClr val="tx1"/>
-                </a:solidFill>
-                <a:effectLst/>
-                <a:latin typeface="+mn-lt"/>
-                <a:ea typeface="+mn-ea"/>
-                <a:cs typeface="+mn-cs"/>
-              </a:rPr>
-              <a:t>, aumentando a receita e faturamento.</a:t>
-            </a:r>
-          </a:p>
-          <a:p>
-            <a:r>
-              <a:rPr lang="pt-BR" sz="1200" kern="1200" dirty="0" smtClean="0">
-                <a:solidFill>
-                  <a:schemeClr val="tx1"/>
-                </a:solidFill>
-                <a:effectLst/>
-                <a:latin typeface="+mn-lt"/>
-                <a:ea typeface="+mn-ea"/>
-                <a:cs typeface="+mn-cs"/>
-              </a:rPr>
-              <a:t>Procuramos, também, refletir maior segurança para os usuários de bicicleta, possibilitando a recuperação de seu bem no caso de sinistro.</a:t>
-            </a:r>
-          </a:p>
-          <a:p>
-            <a:r>
-              <a:rPr lang="pt-BR" sz="1200" kern="1200" dirty="0" smtClean="0">
-                <a:solidFill>
-                  <a:schemeClr val="tx1"/>
-                </a:solidFill>
-                <a:effectLst/>
-                <a:latin typeface="+mn-lt"/>
-                <a:ea typeface="+mn-ea"/>
-                <a:cs typeface="+mn-cs"/>
-              </a:rPr>
-              <a:t>Ainda, visamos adequar e alinhar mais um produto com a Nova Cultura </a:t>
-            </a:r>
-            <a:r>
-              <a:rPr lang="pt-BR" sz="1200" kern="1200" dirty="0" err="1" smtClean="0">
-                <a:solidFill>
-                  <a:schemeClr val="tx1"/>
-                </a:solidFill>
-                <a:effectLst/>
-                <a:latin typeface="+mn-lt"/>
-                <a:ea typeface="+mn-ea"/>
-                <a:cs typeface="+mn-cs"/>
-              </a:rPr>
-              <a:t>Ituran</a:t>
-            </a:r>
-            <a:r>
-              <a:rPr lang="pt-BR" sz="1200" kern="1200" dirty="0" smtClean="0">
-                <a:solidFill>
-                  <a:schemeClr val="tx1"/>
-                </a:solidFill>
-                <a:effectLst/>
-                <a:latin typeface="+mn-lt"/>
-                <a:ea typeface="+mn-ea"/>
-                <a:cs typeface="+mn-cs"/>
-              </a:rPr>
-              <a:t>, promovendo uma maior qualidade de vida tanto para os usuários de bicicleta quanto para os demais, ao passo que cada usuário representa menos utilização do transporte convencional. </a:t>
-            </a:r>
-          </a:p>
-          <a:p>
-            <a:r>
-              <a:rPr lang="pt-BR" sz="1200" kern="1200" dirty="0" smtClean="0">
-                <a:solidFill>
-                  <a:schemeClr val="tx1"/>
-                </a:solidFill>
-                <a:effectLst/>
-                <a:latin typeface="+mn-lt"/>
-                <a:ea typeface="+mn-ea"/>
-                <a:cs typeface="+mn-cs"/>
-              </a:rPr>
-              <a:t>Esse projeto representa, inclusive, o apoio à uma mudança do </a:t>
-            </a:r>
-            <a:r>
-              <a:rPr lang="pt-BR" sz="1200" kern="1200" dirty="0" err="1" smtClean="0">
-                <a:solidFill>
-                  <a:schemeClr val="tx1"/>
-                </a:solidFill>
-                <a:effectLst/>
-                <a:latin typeface="+mn-lt"/>
-                <a:ea typeface="+mn-ea"/>
-                <a:cs typeface="+mn-cs"/>
-              </a:rPr>
-              <a:t>mindset</a:t>
-            </a:r>
-            <a:r>
-              <a:rPr lang="pt-BR" sz="1200" kern="1200" dirty="0" smtClean="0">
-                <a:solidFill>
-                  <a:schemeClr val="tx1"/>
-                </a:solidFill>
-                <a:effectLst/>
-                <a:latin typeface="+mn-lt"/>
-                <a:ea typeface="+mn-ea"/>
-                <a:cs typeface="+mn-cs"/>
-              </a:rPr>
-              <a:t> da população, incentivando atitudes e posturas mais sustentáveis.</a:t>
-            </a:r>
-          </a:p>
-          <a:p>
-            <a:endParaRPr lang="pt-BR" dirty="0"/>
-          </a:p>
         </p:txBody>
       </p:sp>
       <p:sp>
@@ -1080,7 +1192,7 @@
     </p:spTree>
     <p:extLst>
       <p:ext uri="{BB962C8B-B14F-4D97-AF65-F5344CB8AC3E}">
-        <p14:creationId xmlns:p14="http://schemas.microsoft.com/office/powerpoint/2010/main" val="3497693858"/>
+        <p14:creationId xmlns:p14="http://schemas.microsoft.com/office/powerpoint/2010/main" val="1382097954"/>
       </p:ext>
     </p:extLst>
   </p:cSld>
@@ -1144,10 +1256,12 @@
                 <a:ea typeface="+mn-ea"/>
                 <a:cs typeface="+mn-cs"/>
               </a:rPr>
-              <a:t>Slide 12 – </a:t>
-            </a:r>
-            <a:r>
-              <a:rPr lang="pt-BR" sz="1200" b="1" kern="1200" dirty="0" err="1" smtClean="0">
+              <a:t>Slide 12 - Quanto</a:t>
+            </a:r>
+          </a:p>
+          <a:p>
+            <a:r>
+              <a:rPr lang="pt-BR" sz="1200" kern="1200" dirty="0" smtClean="0">
                 <a:solidFill>
                   <a:schemeClr val="tx1"/>
                 </a:solidFill>
@@ -1156,10 +1270,12 @@
                 <a:ea typeface="+mn-ea"/>
                 <a:cs typeface="+mn-cs"/>
               </a:rPr>
-              <a:t>Storyboard</a:t>
-            </a:r>
-            <a:r>
-              <a:rPr lang="pt-BR" sz="1200" b="1" kern="1200" dirty="0" smtClean="0">
+              <a:t>Ainda que tenhamos procurado diversos colegas de diversas áreas, os custos que conseguimos atingir são apenas estimados. Estes custos envolvem o seguinte:</a:t>
+            </a:r>
+          </a:p>
+          <a:p>
+            <a:r>
+              <a:rPr lang="pt-BR" sz="1200" kern="1200" dirty="0" smtClean="0">
                 <a:solidFill>
                   <a:schemeClr val="tx1"/>
                 </a:solidFill>
@@ -1168,11 +1284,59 @@
                 <a:ea typeface="+mn-ea"/>
                 <a:cs typeface="+mn-cs"/>
               </a:rPr>
-              <a:t> / Quadrinhos</a:t>
-            </a:r>
-          </a:p>
-          <a:p>
-            <a:endParaRPr lang="pt-BR" dirty="0"/>
+              <a:t>O redesenho da placa de circuito do rastreador para caber em uma bicicleta; envolve a área técnica e necessita de um engenheiro eletrônico.</a:t>
+            </a:r>
+          </a:p>
+          <a:p>
+            <a:r>
+              <a:rPr lang="pt-BR" sz="1200" kern="1200" dirty="0" smtClean="0">
+                <a:solidFill>
+                  <a:schemeClr val="tx1"/>
+                </a:solidFill>
+                <a:effectLst/>
+                <a:latin typeface="+mn-lt"/>
+                <a:ea typeface="+mn-ea"/>
+                <a:cs typeface="+mn-cs"/>
+              </a:rPr>
+              <a:t>O desenvolvimento do portal de integração com as seguradoras – no formato do portal e-commerce atual; envolve a área de TI.</a:t>
+            </a:r>
+          </a:p>
+          <a:p>
+            <a:r>
+              <a:rPr lang="pt-BR" sz="1200" kern="1200" dirty="0" smtClean="0">
+                <a:solidFill>
+                  <a:schemeClr val="tx1"/>
+                </a:solidFill>
+                <a:effectLst/>
+                <a:latin typeface="+mn-lt"/>
+                <a:ea typeface="+mn-ea"/>
+                <a:cs typeface="+mn-cs"/>
+              </a:rPr>
+              <a:t>O planejamento de marketing; envolvendo a própria.</a:t>
+            </a:r>
+          </a:p>
+          <a:p>
+            <a:r>
+              <a:rPr lang="pt-BR" sz="1200" kern="1200" dirty="0" smtClean="0">
+                <a:solidFill>
+                  <a:schemeClr val="tx1"/>
+                </a:solidFill>
+                <a:effectLst/>
+                <a:latin typeface="+mn-lt"/>
+                <a:ea typeface="+mn-ea"/>
+                <a:cs typeface="+mn-cs"/>
+              </a:rPr>
+              <a:t>O treinamento para as áreas envolvidas e parceiros que instalarão os kits.</a:t>
+            </a:r>
+            <a:endParaRPr lang="pt-BR" sz="1200" kern="1200" dirty="0">
+              <a:solidFill>
+                <a:schemeClr val="tx1"/>
+              </a:solidFill>
+              <a:effectLst/>
+              <a:latin typeface="+mn-lt"/>
+              <a:ea typeface="+mn-ea"/>
+              <a:cs typeface="+mn-cs"/>
+            </a:endParaRPr>
           </a:p>
         </p:txBody>
       </p:sp>
@@ -1202,7 +1366,7 @@
     </p:spTree>
     <p:extLst>
       <p:ext uri="{BB962C8B-B14F-4D97-AF65-F5344CB8AC3E}">
-        <p14:creationId xmlns:p14="http://schemas.microsoft.com/office/powerpoint/2010/main" val="913492627"/>
+        <p14:creationId xmlns:p14="http://schemas.microsoft.com/office/powerpoint/2010/main" val="2609330044"/>
       </p:ext>
     </p:extLst>
   </p:cSld>
@@ -1266,11 +1430,166 @@
                 <a:ea typeface="+mn-ea"/>
                 <a:cs typeface="+mn-cs"/>
               </a:rPr>
-              <a:t>Slide 13 – Protótipo</a:t>
-            </a:r>
-          </a:p>
-          <a:p>
-            <a:endParaRPr lang="pt-BR" dirty="0"/>
+              <a:t>Slide 13 </a:t>
+            </a:r>
+            <a:r>
+              <a:rPr lang="pt-BR" sz="1200" b="1" kern="1200" dirty="0" err="1" smtClean="0">
+                <a:solidFill>
+                  <a:schemeClr val="tx1"/>
+                </a:solidFill>
+                <a:effectLst/>
+                <a:latin typeface="+mn-lt"/>
+                <a:ea typeface="+mn-ea"/>
+                <a:cs typeface="+mn-cs"/>
+              </a:rPr>
+              <a:t>Por-quê</a:t>
+            </a:r>
+            <a:endParaRPr lang="pt-BR" sz="1200" b="1" kern="1200" dirty="0" smtClean="0">
+              <a:solidFill>
+                <a:schemeClr val="tx1"/>
+              </a:solidFill>
+              <a:effectLst/>
+              <a:latin typeface="+mn-lt"/>
+              <a:ea typeface="+mn-ea"/>
+              <a:cs typeface="+mn-cs"/>
+            </a:endParaRPr>
+          </a:p>
+          <a:p>
+            <a:r>
+              <a:rPr lang="pt-BR" sz="1200" kern="1200" dirty="0" smtClean="0">
+                <a:solidFill>
+                  <a:schemeClr val="tx1"/>
+                </a:solidFill>
+                <a:effectLst/>
+                <a:latin typeface="+mn-lt"/>
+                <a:ea typeface="+mn-ea"/>
+                <a:cs typeface="+mn-cs"/>
+              </a:rPr>
+              <a:t>Ao implementar a nossa ideia, esperamos como resultado criar um novo nicho de mercado para a </a:t>
+            </a:r>
+            <a:r>
+              <a:rPr lang="pt-BR" sz="1200" kern="1200" dirty="0" err="1" smtClean="0">
+                <a:solidFill>
+                  <a:schemeClr val="tx1"/>
+                </a:solidFill>
+                <a:effectLst/>
+                <a:latin typeface="+mn-lt"/>
+                <a:ea typeface="+mn-ea"/>
+                <a:cs typeface="+mn-cs"/>
+              </a:rPr>
+              <a:t>Ituran</a:t>
+            </a:r>
+            <a:r>
+              <a:rPr lang="pt-BR" sz="1200" kern="1200" dirty="0" smtClean="0">
+                <a:solidFill>
+                  <a:schemeClr val="tx1"/>
+                </a:solidFill>
+                <a:effectLst/>
+                <a:latin typeface="+mn-lt"/>
+                <a:ea typeface="+mn-ea"/>
+                <a:cs typeface="+mn-cs"/>
+              </a:rPr>
+              <a:t>, aumentando a receita e faturamento.</a:t>
+            </a:r>
+          </a:p>
+          <a:p>
+            <a:r>
+              <a:rPr lang="pt-BR" sz="1200" kern="1200" dirty="0" smtClean="0">
+                <a:solidFill>
+                  <a:schemeClr val="tx1"/>
+                </a:solidFill>
+                <a:effectLst/>
+                <a:latin typeface="+mn-lt"/>
+                <a:ea typeface="+mn-ea"/>
+                <a:cs typeface="+mn-cs"/>
+              </a:rPr>
+              <a:t>Procuramos, também, refletir maior segurança para os usuários de bicicleta, possibilitando a recuperação de seu bem no caso de sinistro.</a:t>
+            </a:r>
+          </a:p>
+          <a:p>
+            <a:r>
+              <a:rPr lang="pt-BR" sz="1200" kern="1200" dirty="0" smtClean="0">
+                <a:solidFill>
+                  <a:schemeClr val="tx1"/>
+                </a:solidFill>
+                <a:effectLst/>
+                <a:latin typeface="+mn-lt"/>
+                <a:ea typeface="+mn-ea"/>
+                <a:cs typeface="+mn-cs"/>
+              </a:rPr>
+              <a:t>Ainda, visamos adequar e alinhar mais um produto com a Nova Cultura </a:t>
+            </a:r>
+            <a:r>
+              <a:rPr lang="pt-BR" sz="1200" kern="1200" dirty="0" err="1" smtClean="0">
+                <a:solidFill>
+                  <a:schemeClr val="tx1"/>
+                </a:solidFill>
+                <a:effectLst/>
+                <a:latin typeface="+mn-lt"/>
+                <a:ea typeface="+mn-ea"/>
+                <a:cs typeface="+mn-cs"/>
+              </a:rPr>
+              <a:t>Ituran</a:t>
+            </a:r>
+            <a:r>
+              <a:rPr lang="pt-BR" sz="1200" kern="1200" dirty="0" smtClean="0">
+                <a:solidFill>
+                  <a:schemeClr val="tx1"/>
+                </a:solidFill>
+                <a:effectLst/>
+                <a:latin typeface="+mn-lt"/>
+                <a:ea typeface="+mn-ea"/>
+                <a:cs typeface="+mn-cs"/>
+              </a:rPr>
+              <a:t>, promovendo uma maior qualidade de vida tanto para os usuários de bicicleta quanto para os demais, ao passo que cada usuário representa menos utilização do transporte convencional. </a:t>
+            </a:r>
+          </a:p>
+          <a:p>
+            <a:r>
+              <a:rPr lang="pt-BR" sz="1200" kern="1200" dirty="0" smtClean="0">
+                <a:solidFill>
+                  <a:schemeClr val="tx1"/>
+                </a:solidFill>
+                <a:effectLst/>
+                <a:latin typeface="+mn-lt"/>
+                <a:ea typeface="+mn-ea"/>
+                <a:cs typeface="+mn-cs"/>
+              </a:rPr>
+              <a:t>Esse projeto representa, inclusive, o apoio à uma mudança do </a:t>
+            </a:r>
+            <a:r>
+              <a:rPr lang="pt-BR" sz="1200" kern="1200" dirty="0" err="1" smtClean="0">
+                <a:solidFill>
+                  <a:schemeClr val="tx1"/>
+                </a:solidFill>
+                <a:effectLst/>
+                <a:latin typeface="+mn-lt"/>
+                <a:ea typeface="+mn-ea"/>
+                <a:cs typeface="+mn-cs"/>
+              </a:rPr>
+              <a:t>mindset</a:t>
+            </a:r>
+            <a:r>
+              <a:rPr lang="pt-BR" sz="1200" kern="1200" dirty="0" smtClean="0">
+                <a:solidFill>
+                  <a:schemeClr val="tx1"/>
+                </a:solidFill>
+                <a:effectLst/>
+                <a:latin typeface="+mn-lt"/>
+                <a:ea typeface="+mn-ea"/>
+                <a:cs typeface="+mn-cs"/>
+              </a:rPr>
+              <a:t> da população, incentivando atitudes e posturas mais sustentáveis.</a:t>
+            </a:r>
+            <a:endParaRPr lang="pt-BR" sz="1200" kern="1200" dirty="0">
+              <a:solidFill>
+                <a:schemeClr val="tx1"/>
+              </a:solidFill>
+              <a:effectLst/>
+              <a:latin typeface="+mn-lt"/>
+              <a:ea typeface="+mn-ea"/>
+              <a:cs typeface="+mn-cs"/>
+            </a:endParaRPr>
           </a:p>
         </p:txBody>
       </p:sp>
@@ -1300,7 +1619,7 @@
     </p:spTree>
     <p:extLst>
       <p:ext uri="{BB962C8B-B14F-4D97-AF65-F5344CB8AC3E}">
-        <p14:creationId xmlns:p14="http://schemas.microsoft.com/office/powerpoint/2010/main" val="548549772"/>
+        <p14:creationId xmlns:p14="http://schemas.microsoft.com/office/powerpoint/2010/main" val="3497693858"/>
       </p:ext>
     </p:extLst>
   </p:cSld>
@@ -1364,12 +1683,10 @@
                 <a:ea typeface="+mn-ea"/>
                 <a:cs typeface="+mn-cs"/>
               </a:rPr>
-              <a:t>Slide 14 – Referências / Bibliografia</a:t>
-            </a:r>
-          </a:p>
-          <a:p>
-            <a:r>
-              <a:rPr lang="pt-BR" sz="1200" kern="1200" dirty="0" smtClean="0">
+              <a:t>Slide 14 – </a:t>
+            </a:r>
+            <a:r>
+              <a:rPr lang="pt-BR" sz="1200" b="1" kern="1200" dirty="0" err="1" smtClean="0">
                 <a:solidFill>
                   <a:schemeClr val="tx1"/>
                 </a:solidFill>
@@ -1378,7 +1695,33 @@
                 <a:ea typeface="+mn-ea"/>
                 <a:cs typeface="+mn-cs"/>
               </a:rPr>
-              <a:t> </a:t>
+              <a:t>Storyboard</a:t>
+            </a:r>
+            <a:r>
+              <a:rPr lang="pt-BR" sz="1200" b="1" kern="1200" dirty="0" smtClean="0">
+                <a:solidFill>
+                  <a:schemeClr val="tx1"/>
+                </a:solidFill>
+                <a:effectLst/>
+                <a:latin typeface="+mn-lt"/>
+                <a:ea typeface="+mn-ea"/>
+                <a:cs typeface="+mn-cs"/>
+              </a:rPr>
+              <a:t> / Quadrinhos</a:t>
+            </a:r>
+          </a:p>
+          <a:p>
+            <a:r>
+              <a:rPr lang="pt-BR" sz="1200" kern="1200" dirty="0" smtClean="0">
+                <a:solidFill>
+                  <a:schemeClr val="tx1"/>
+                </a:solidFill>
+                <a:effectLst/>
+                <a:latin typeface="+mn-lt"/>
+                <a:ea typeface="+mn-ea"/>
+                <a:cs typeface="+mn-cs"/>
+              </a:rPr>
+              <a:t>E para ilustrar a interação do usuário, de uma forma mais descontraída, bolamos esse HQ. </a:t>
             </a:r>
           </a:p>
           <a:p>
@@ -1404,6 +1747,268 @@
             <a:fld id="{2909B70C-FFAB-4054-8B2A-9EB823FEDD21}" type="slidenum">
               <a:rPr lang="pt-BR" smtClean="0"/>
               <a:t>14</a:t>
+            </a:fld>
+            <a:endParaRPr lang="pt-BR"/>
+          </a:p>
+        </p:txBody>
+      </p:sp>
+    </p:spTree>
+    <p:extLst>
+      <p:ext uri="{BB962C8B-B14F-4D97-AF65-F5344CB8AC3E}">
+        <p14:creationId xmlns:p14="http://schemas.microsoft.com/office/powerpoint/2010/main" val="913492627"/>
+      </p:ext>
+    </p:extLst>
+  </p:cSld>
+  <p:clrMapOvr>
+    <a:masterClrMapping/>
+  </p:clrMapOvr>
+</p:notes>
+</file>
+
+<file path=ppt/notesSlides/notesSlide15.xml><?xml version="1.0" encoding="utf-8"?>
+<p:notes xmlns:a="http://schemas.openxmlformats.org/drawingml/2006/main" xmlns:r="http://schemas.openxmlformats.org/officeDocument/2006/relationships" xmlns:p="http://schemas.openxmlformats.org/presentationml/2006/main">
+  <p:cSld>
+    <p:spTree>
+      <p:nvGrpSpPr>
+        <p:cNvPr id="1" name=""/>
+        <p:cNvGrpSpPr/>
+        <p:nvPr/>
+      </p:nvGrpSpPr>
+      <p:grpSpPr>
+        <a:xfrm>
+          <a:off x="0" y="0"/>
+          <a:ext cx="0" cy="0"/>
+          <a:chOff x="0" y="0"/>
+          <a:chExt cx="0" cy="0"/>
+        </a:xfrm>
+      </p:grpSpPr>
+      <p:sp>
+        <p:nvSpPr>
+          <p:cNvPr id="2" name="Espaço Reservado para Imagem de Slide 1"/>
+          <p:cNvSpPr>
+            <a:spLocks noGrp="1" noRot="1" noChangeAspect="1"/>
+          </p:cNvSpPr>
+          <p:nvPr>
+            <p:ph type="sldImg"/>
+          </p:nvPr>
+        </p:nvSpPr>
+        <p:spPr/>
+      </p:sp>
+      <p:sp>
+        <p:nvSpPr>
+          <p:cNvPr id="3" name="Espaço Reservado para Anotações 2"/>
+          <p:cNvSpPr>
+            <a:spLocks noGrp="1"/>
+          </p:cNvSpPr>
+          <p:nvPr>
+            <p:ph type="body" idx="1"/>
+          </p:nvPr>
+        </p:nvSpPr>
+        <p:spPr/>
+        <p:txBody>
+          <a:bodyPr/>
+          <a:lstStyle/>
+          <a:p>
+            <a:r>
+              <a:rPr lang="pt-BR" sz="1200" b="1" kern="1200" dirty="0" smtClean="0">
+                <a:solidFill>
+                  <a:schemeClr val="tx1"/>
+                </a:solidFill>
+                <a:effectLst/>
+                <a:latin typeface="+mn-lt"/>
+                <a:ea typeface="+mn-ea"/>
+                <a:cs typeface="+mn-cs"/>
+              </a:rPr>
+              <a:t>Slide 15 – Protótipo</a:t>
+            </a:r>
+          </a:p>
+          <a:p>
+            <a:r>
+              <a:rPr lang="pt-BR" sz="1200" kern="1200" dirty="0" smtClean="0">
+                <a:solidFill>
+                  <a:schemeClr val="tx1"/>
+                </a:solidFill>
+                <a:effectLst/>
+                <a:latin typeface="+mn-lt"/>
+                <a:ea typeface="+mn-ea"/>
+                <a:cs typeface="+mn-cs"/>
+              </a:rPr>
+              <a:t>Também, desenvolvemos um protótipo de cotação dos serviços de Rastreador e Rastreador mais Seguro.  </a:t>
+            </a:r>
+          </a:p>
+          <a:p>
+            <a:r>
+              <a:rPr lang="pt-BR" sz="1200" kern="1200" dirty="0" smtClean="0">
+                <a:solidFill>
+                  <a:schemeClr val="tx1"/>
+                </a:solidFill>
+                <a:effectLst/>
+                <a:latin typeface="+mn-lt"/>
+                <a:ea typeface="+mn-ea"/>
+                <a:cs typeface="+mn-cs"/>
+              </a:rPr>
+              <a:t>Para estimar esses valores de seguros, somamos o valor da mensalidade do rastreador atual da </a:t>
+            </a:r>
+            <a:r>
+              <a:rPr lang="pt-BR" sz="1200" kern="1200" dirty="0" err="1" smtClean="0">
+                <a:solidFill>
+                  <a:schemeClr val="tx1"/>
+                </a:solidFill>
+                <a:effectLst/>
+                <a:latin typeface="+mn-lt"/>
+                <a:ea typeface="+mn-ea"/>
+                <a:cs typeface="+mn-cs"/>
+              </a:rPr>
+              <a:t>Ituran</a:t>
+            </a:r>
+            <a:r>
+              <a:rPr lang="pt-BR" sz="1200" kern="1200" smtClean="0">
+                <a:solidFill>
+                  <a:schemeClr val="tx1"/>
+                </a:solidFill>
+                <a:effectLst/>
+                <a:latin typeface="+mn-lt"/>
+                <a:ea typeface="+mn-ea"/>
+                <a:cs typeface="+mn-cs"/>
+              </a:rPr>
+              <a:t> com a uma estimativa de 15% do valor original da bicicleta.</a:t>
+            </a:r>
+          </a:p>
+          <a:p>
+            <a:endParaRPr lang="pt-BR" dirty="0"/>
+          </a:p>
+        </p:txBody>
+      </p:sp>
+      <p:sp>
+        <p:nvSpPr>
+          <p:cNvPr id="4" name="Espaço Reservado para Número de Slide 3"/>
+          <p:cNvSpPr>
+            <a:spLocks noGrp="1"/>
+          </p:cNvSpPr>
+          <p:nvPr>
+            <p:ph type="sldNum" sz="quarter" idx="10"/>
+          </p:nvPr>
+        </p:nvSpPr>
+        <p:spPr/>
+        <p:txBody>
+          <a:bodyPr/>
+          <a:lstStyle/>
+          <a:p>
+            <a:fld id="{2909B70C-FFAB-4054-8B2A-9EB823FEDD21}" type="slidenum">
+              <a:rPr lang="pt-BR" smtClean="0"/>
+              <a:t>15</a:t>
+            </a:fld>
+            <a:endParaRPr lang="pt-BR"/>
+          </a:p>
+        </p:txBody>
+      </p:sp>
+    </p:spTree>
+    <p:extLst>
+      <p:ext uri="{BB962C8B-B14F-4D97-AF65-F5344CB8AC3E}">
+        <p14:creationId xmlns:p14="http://schemas.microsoft.com/office/powerpoint/2010/main" val="548549772"/>
+      </p:ext>
+    </p:extLst>
+  </p:cSld>
+  <p:clrMapOvr>
+    <a:masterClrMapping/>
+  </p:clrMapOvr>
+</p:notes>
+</file>
+
+<file path=ppt/notesSlides/notesSlide16.xml><?xml version="1.0" encoding="utf-8"?>
+<p:notes xmlns:a="http://schemas.openxmlformats.org/drawingml/2006/main" xmlns:r="http://schemas.openxmlformats.org/officeDocument/2006/relationships" xmlns:p="http://schemas.openxmlformats.org/presentationml/2006/main">
+  <p:cSld>
+    <p:spTree>
+      <p:nvGrpSpPr>
+        <p:cNvPr id="1" name=""/>
+        <p:cNvGrpSpPr/>
+        <p:nvPr/>
+      </p:nvGrpSpPr>
+      <p:grpSpPr>
+        <a:xfrm>
+          <a:off x="0" y="0"/>
+          <a:ext cx="0" cy="0"/>
+          <a:chOff x="0" y="0"/>
+          <a:chExt cx="0" cy="0"/>
+        </a:xfrm>
+      </p:grpSpPr>
+      <p:sp>
+        <p:nvSpPr>
+          <p:cNvPr id="2" name="Espaço Reservado para Imagem de Slide 1"/>
+          <p:cNvSpPr>
+            <a:spLocks noGrp="1" noRot="1" noChangeAspect="1"/>
+          </p:cNvSpPr>
+          <p:nvPr>
+            <p:ph type="sldImg"/>
+          </p:nvPr>
+        </p:nvSpPr>
+        <p:spPr/>
+      </p:sp>
+      <p:sp>
+        <p:nvSpPr>
+          <p:cNvPr id="3" name="Espaço Reservado para Anotações 2"/>
+          <p:cNvSpPr>
+            <a:spLocks noGrp="1"/>
+          </p:cNvSpPr>
+          <p:nvPr>
+            <p:ph type="body" idx="1"/>
+          </p:nvPr>
+        </p:nvSpPr>
+        <p:spPr/>
+        <p:txBody>
+          <a:bodyPr/>
+          <a:lstStyle/>
+          <a:p>
+            <a:r>
+              <a:rPr lang="pt-BR" sz="1200" b="1" kern="1200" dirty="0" smtClean="0">
+                <a:solidFill>
+                  <a:schemeClr val="tx1"/>
+                </a:solidFill>
+                <a:effectLst/>
+                <a:latin typeface="+mn-lt"/>
+                <a:ea typeface="+mn-ea"/>
+                <a:cs typeface="+mn-cs"/>
+              </a:rPr>
+              <a:t>Slide 14 – Referências / Bibliografia</a:t>
+            </a:r>
+          </a:p>
+          <a:p>
+            <a:r>
+              <a:rPr lang="pt-BR" sz="1200" kern="1200" dirty="0" smtClean="0">
+                <a:solidFill>
+                  <a:schemeClr val="tx1"/>
+                </a:solidFill>
+                <a:effectLst/>
+                <a:latin typeface="+mn-lt"/>
+                <a:ea typeface="+mn-ea"/>
+                <a:cs typeface="+mn-cs"/>
+              </a:rPr>
+              <a:t> </a:t>
+            </a:r>
+          </a:p>
+          <a:p>
+            <a:endParaRPr lang="pt-BR" dirty="0"/>
+          </a:p>
+        </p:txBody>
+      </p:sp>
+      <p:sp>
+        <p:nvSpPr>
+          <p:cNvPr id="4" name="Espaço Reservado para Número de Slide 3"/>
+          <p:cNvSpPr>
+            <a:spLocks noGrp="1"/>
+          </p:cNvSpPr>
+          <p:nvPr>
+            <p:ph type="sldNum" sz="quarter" idx="10"/>
+          </p:nvPr>
+        </p:nvSpPr>
+        <p:spPr/>
+        <p:txBody>
+          <a:bodyPr/>
+          <a:lstStyle/>
+          <a:p>
+            <a:fld id="{2909B70C-FFAB-4054-8B2A-9EB823FEDD21}" type="slidenum">
+              <a:rPr lang="pt-BR" smtClean="0"/>
+              <a:t>16</a:t>
             </a:fld>
             <a:endParaRPr lang="pt-BR"/>
           </a:p>
@@ -1556,7 +2161,7 @@
             </a:r>
           </a:p>
           <a:p>
-            <a:endParaRPr lang="pt-BR" dirty="0"/>
+            <a:endParaRPr lang="pt-BR" u="none" dirty="0"/>
           </a:p>
         </p:txBody>
       </p:sp>
@@ -1933,9 +2538,15 @@
               </a:rPr>
               <a:t>Vale ainda pontuar que o formato para a bicicleta difere do formato para motos, pois o cenário de ambas é muito distinto.</a:t>
             </a:r>
-          </a:p>
-          <a:p>
-            <a:endParaRPr lang="pt-BR" dirty="0"/>
+            <a:endParaRPr lang="pt-BR" sz="1200" kern="1200" dirty="0">
+              <a:solidFill>
+                <a:schemeClr val="tx1"/>
+              </a:solidFill>
+              <a:effectLst/>
+              <a:latin typeface="+mn-lt"/>
+              <a:ea typeface="+mn-ea"/>
+              <a:cs typeface="+mn-cs"/>
+            </a:endParaRPr>
           </a:p>
         </p:txBody>
       </p:sp>
@@ -2043,12 +2654,10 @@
                 <a:ea typeface="+mn-ea"/>
                 <a:cs typeface="+mn-cs"/>
               </a:rPr>
-              <a:t>Em uma conversa informal com um amigo da polícia civil, levantamos informalmente que:</a:t>
-            </a:r>
-          </a:p>
-          <a:p>
-            <a:r>
-              <a:rPr lang="pt-BR" sz="1200" kern="1200" dirty="0" smtClean="0">
+              <a:t>Em uma conversa informal com um amigo da polícia civil, levantamos </a:t>
+            </a:r>
+            <a:r>
+              <a:rPr lang="pt-BR" sz="1200" b="1" kern="1200" dirty="0" smtClean="0">
                 <a:solidFill>
                   <a:schemeClr val="tx1"/>
                 </a:solidFill>
@@ -2057,10 +2666,8 @@
                 <a:ea typeface="+mn-ea"/>
                 <a:cs typeface="+mn-cs"/>
               </a:rPr>
-              <a:t>Os roubos de moto se dão basicamente para alimentar o mercado de autopeças e transporte de curtas distancias de pessoas ou ilícitos; proporcionam agilidade e fuga rápida; </a:t>
-            </a:r>
-          </a:p>
-          <a:p>
+              <a:t>não oficialmente</a:t>
+            </a:r>
             <a:r>
               <a:rPr lang="pt-BR" sz="1200" kern="1200" dirty="0" smtClean="0">
                 <a:solidFill>
@@ -2071,11 +2678,45 @@
                 <a:ea typeface="+mn-ea"/>
                 <a:cs typeface="+mn-cs"/>
               </a:rPr>
-              <a:t>Já os roubos de bicicleta não estão ligados ao crime organizado, visam o uso próprio e não possuem um mercado formal; os usuários de bicicleta, que constituem esse mercado, tendem a adquirir seus produtos em lojas especializadas e costumam exigir nota fiscal, para a ocasião de acionamento da garantia.</a:t>
-            </a:r>
-          </a:p>
-          <a:p>
-            <a:endParaRPr lang="pt-BR" dirty="0"/>
+              <a:t> que:</a:t>
+            </a:r>
+          </a:p>
+          <a:p>
+            <a:r>
+              <a:rPr lang="pt-BR" sz="1200" kern="1200" dirty="0" smtClean="0">
+                <a:solidFill>
+                  <a:schemeClr val="tx1"/>
+                </a:solidFill>
+                <a:effectLst/>
+                <a:latin typeface="+mn-lt"/>
+                <a:ea typeface="+mn-ea"/>
+                <a:cs typeface="+mn-cs"/>
+              </a:rPr>
+              <a:t>Os roubos de moto se dão basicamente para alimentar o mercado de autopeças e transporte de curtas distancias de pessoas ou ilícitos; proporcionam agilidade e fuga rápida; </a:t>
+            </a:r>
+          </a:p>
+          <a:p>
+            <a:r>
+              <a:rPr lang="pt-BR" sz="1200" kern="1200" dirty="0" smtClean="0">
+                <a:solidFill>
+                  <a:schemeClr val="tx1"/>
+                </a:solidFill>
+                <a:effectLst/>
+                <a:latin typeface="+mn-lt"/>
+                <a:ea typeface="+mn-ea"/>
+                <a:cs typeface="+mn-cs"/>
+              </a:rPr>
+              <a:t>Já os roubos de bicicleta não estão ligados ao crime organizado, visam o uso próprio e não possuem um mercado formal; os usuários de bicicleta tendem a adquirir seus produtos em lojas especializadas e costumam exigir nota fiscal, para a ocasião de acionamento da garantia.</a:t>
+            </a:r>
+            <a:endParaRPr lang="pt-BR" sz="1200" kern="1200" dirty="0">
+              <a:solidFill>
+                <a:schemeClr val="tx1"/>
+              </a:solidFill>
+              <a:effectLst/>
+              <a:latin typeface="+mn-lt"/>
+              <a:ea typeface="+mn-ea"/>
+              <a:cs typeface="+mn-cs"/>
+            </a:endParaRPr>
           </a:p>
         </p:txBody>
       </p:sp>
@@ -2223,9 +2864,15 @@
               </a:rPr>
               <a:t> no mercado de rastreamento no Brasil.</a:t>
             </a:r>
-          </a:p>
-          <a:p>
-            <a:endParaRPr lang="pt-BR" dirty="0"/>
+            <a:endParaRPr lang="pt-BR" sz="1200" kern="1200" dirty="0">
+              <a:solidFill>
+                <a:schemeClr val="tx1"/>
+              </a:solidFill>
+              <a:effectLst/>
+              <a:latin typeface="+mn-lt"/>
+              <a:ea typeface="+mn-ea"/>
+              <a:cs typeface="+mn-cs"/>
+            </a:endParaRPr>
           </a:p>
         </p:txBody>
       </p:sp>
@@ -2333,8 +2980,19 @@
                 <a:ea typeface="+mn-ea"/>
                 <a:cs typeface="+mn-cs"/>
               </a:rPr>
-              <a:t>Para viabilizar este projeto, planejamos validar nossas premissas por intermédio de uma pesquisa quantitativa, onde aprendemos que a probabilidade de contratação de um serviço de seguro aumenta significativamente conforme o valor do bem, e que quando há um serviço de rastreamento envolvido, a intenção de contratação é ainda maior.</a:t>
-            </a:r>
+              <a:t>Para viabilizar este projeto, planejamos validar nossas premissas com uma pesquisa quantitativa, onde aprendemos que a probabilidade de contratação de um serviço de seguro aumenta significativamente conforme o valor do bem, e que quando há um serviço de rastreamento envolvido, a intenção de contratação é ainda maior.</a:t>
+            </a:r>
+          </a:p>
+          <a:p>
+            <a:endParaRPr lang="pt-BR" sz="1200" kern="1200" dirty="0" smtClean="0">
+              <a:solidFill>
+                <a:schemeClr val="tx1"/>
+              </a:solidFill>
+              <a:effectLst/>
+              <a:latin typeface="+mn-lt"/>
+              <a:ea typeface="+mn-ea"/>
+              <a:cs typeface="+mn-cs"/>
+            </a:endParaRPr>
           </a:p>
           <a:p>
             <a:r>
@@ -2347,107 +3005,17 @@
                 <a:ea typeface="+mn-ea"/>
                 <a:cs typeface="+mn-cs"/>
               </a:rPr>
-              <a:t>Achamos pertinente, também, levantar parcerias para atuar no modelo atual de “</a:t>
-            </a:r>
-            <a:r>
-              <a:rPr lang="pt-BR" sz="1200" kern="1200" dirty="0" err="1" smtClean="0">
-                <a:solidFill>
-                  <a:schemeClr val="tx1"/>
-                </a:solidFill>
-                <a:effectLst/>
-                <a:latin typeface="+mn-lt"/>
-                <a:ea typeface="+mn-ea"/>
-                <a:cs typeface="+mn-cs"/>
-              </a:rPr>
-              <a:t>Ituran</a:t>
-            </a:r>
-            <a:r>
-              <a:rPr lang="pt-BR" sz="1200" kern="1200" dirty="0" smtClean="0">
-                <a:solidFill>
-                  <a:schemeClr val="tx1"/>
-                </a:solidFill>
-                <a:effectLst/>
-                <a:latin typeface="+mn-lt"/>
-                <a:ea typeface="+mn-ea"/>
-                <a:cs typeface="+mn-cs"/>
-              </a:rPr>
-              <a:t> com seguro”, e temos contatos avançados com estes dois importantes players da área de seguro para </a:t>
-            </a:r>
-            <a:r>
-              <a:rPr lang="pt-BR" sz="1200" kern="1200" dirty="0" err="1" smtClean="0">
-                <a:solidFill>
-                  <a:schemeClr val="tx1"/>
-                </a:solidFill>
-                <a:effectLst/>
-                <a:latin typeface="+mn-lt"/>
-                <a:ea typeface="+mn-ea"/>
-                <a:cs typeface="+mn-cs"/>
-              </a:rPr>
-              <a:t>bikes</a:t>
-            </a:r>
-            <a:r>
-              <a:rPr lang="pt-BR" sz="1200" kern="1200" dirty="0" smtClean="0">
-                <a:solidFill>
-                  <a:schemeClr val="tx1"/>
-                </a:solidFill>
-                <a:effectLst/>
-                <a:latin typeface="+mn-lt"/>
-                <a:ea typeface="+mn-ea"/>
-                <a:cs typeface="+mn-cs"/>
-              </a:rPr>
-              <a:t>. A </a:t>
-            </a:r>
-            <a:r>
-              <a:rPr lang="pt-BR" sz="1200" kern="1200" dirty="0" err="1" smtClean="0">
-                <a:solidFill>
-                  <a:schemeClr val="tx1"/>
-                </a:solidFill>
-                <a:effectLst/>
-                <a:latin typeface="+mn-lt"/>
-                <a:ea typeface="+mn-ea"/>
-                <a:cs typeface="+mn-cs"/>
-              </a:rPr>
-              <a:t>vélo</a:t>
-            </a:r>
-            <a:r>
-              <a:rPr lang="pt-BR" sz="1200" kern="1200" dirty="0" smtClean="0">
-                <a:solidFill>
-                  <a:schemeClr val="tx1"/>
-                </a:solidFill>
-                <a:effectLst/>
-                <a:latin typeface="+mn-lt"/>
-                <a:ea typeface="+mn-ea"/>
-                <a:cs typeface="+mn-cs"/>
-              </a:rPr>
-              <a:t> seguro e a </a:t>
-            </a:r>
-            <a:r>
-              <a:rPr lang="pt-BR" sz="1200" kern="1200" dirty="0" err="1" smtClean="0">
-                <a:solidFill>
-                  <a:schemeClr val="tx1"/>
-                </a:solidFill>
-                <a:effectLst/>
-                <a:latin typeface="+mn-lt"/>
-                <a:ea typeface="+mn-ea"/>
-                <a:cs typeface="+mn-cs"/>
-              </a:rPr>
-              <a:t>kakau</a:t>
-            </a:r>
-            <a:r>
-              <a:rPr lang="pt-BR" sz="1200" kern="1200" dirty="0" smtClean="0">
-                <a:solidFill>
-                  <a:schemeClr val="tx1"/>
-                </a:solidFill>
-                <a:effectLst/>
-                <a:latin typeface="+mn-lt"/>
-                <a:ea typeface="+mn-ea"/>
-                <a:cs typeface="+mn-cs"/>
-              </a:rPr>
-              <a:t>, ambas focadas principalmente em seguro de bicicletas.</a:t>
-            </a:r>
-          </a:p>
-          <a:p>
-            <a:endParaRPr lang="pt-BR" dirty="0"/>
+              <a:t>A média da intenção de contratação (de zero a dez) varia conforme estes gráficos</a:t>
+            </a:r>
+            <a:endParaRPr lang="pt-BR" sz="1200" kern="1200" dirty="0">
+              <a:solidFill>
+                <a:schemeClr val="tx1"/>
+              </a:solidFill>
+              <a:effectLst/>
+              <a:latin typeface="+mn-lt"/>
+              <a:ea typeface="+mn-ea"/>
+              <a:cs typeface="+mn-cs"/>
+            </a:endParaRPr>
           </a:p>
         </p:txBody>
       </p:sp>
@@ -2541,7 +3109,7 @@
                 <a:ea typeface="+mn-ea"/>
                 <a:cs typeface="+mn-cs"/>
               </a:rPr>
-              <a:t>Slide 9 - Como</a:t>
+              <a:t>Slide 9 – Como</a:t>
             </a:r>
           </a:p>
           <a:p>
@@ -2555,93 +3123,7 @@
                 <a:ea typeface="+mn-ea"/>
                 <a:cs typeface="+mn-cs"/>
               </a:rPr>
-              <a:t>Consideramos que, se o projeto vier a ser implementado, os próximos passos de planejamento seriam os seguintes:</a:t>
-            </a:r>
-          </a:p>
-          <a:p>
-            <a:r>
-              <a:rPr lang="pt-BR" sz="1200" kern="1200" dirty="0" smtClean="0">
-                <a:solidFill>
-                  <a:schemeClr val="tx1"/>
-                </a:solidFill>
-                <a:effectLst/>
-                <a:latin typeface="+mn-lt"/>
-                <a:ea typeface="+mn-ea"/>
-                <a:cs typeface="+mn-cs"/>
-              </a:rPr>
-              <a:t>Definir o plano de marketing, se vai manter a campanha atual e ampliar para o </a:t>
-            </a:r>
-            <a:r>
-              <a:rPr lang="pt-BR" sz="1200" kern="1200" dirty="0" err="1" smtClean="0">
-                <a:solidFill>
-                  <a:schemeClr val="tx1"/>
-                </a:solidFill>
-                <a:effectLst/>
-                <a:latin typeface="+mn-lt"/>
-                <a:ea typeface="+mn-ea"/>
-                <a:cs typeface="+mn-cs"/>
-              </a:rPr>
-              <a:t>ituran</a:t>
-            </a:r>
-            <a:r>
-              <a:rPr lang="pt-BR" sz="1200" kern="1200" dirty="0" smtClean="0">
-                <a:solidFill>
-                  <a:schemeClr val="tx1"/>
-                </a:solidFill>
-                <a:effectLst/>
-                <a:latin typeface="+mn-lt"/>
-                <a:ea typeface="+mn-ea"/>
-                <a:cs typeface="+mn-cs"/>
-              </a:rPr>
-              <a:t> com seguro </a:t>
-            </a:r>
-            <a:r>
-              <a:rPr lang="pt-BR" sz="1200" kern="1200" dirty="0" err="1" smtClean="0">
-                <a:solidFill>
-                  <a:schemeClr val="tx1"/>
-                </a:solidFill>
-                <a:effectLst/>
-                <a:latin typeface="+mn-lt"/>
-                <a:ea typeface="+mn-ea"/>
-                <a:cs typeface="+mn-cs"/>
-              </a:rPr>
-              <a:t>bike</a:t>
-            </a:r>
-            <a:r>
-              <a:rPr lang="pt-BR" sz="1200" kern="1200" dirty="0" smtClean="0">
-                <a:solidFill>
-                  <a:schemeClr val="tx1"/>
-                </a:solidFill>
-                <a:effectLst/>
-                <a:latin typeface="+mn-lt"/>
-                <a:ea typeface="+mn-ea"/>
-                <a:cs typeface="+mn-cs"/>
-              </a:rPr>
-              <a:t>, definir mídia de veiculação, </a:t>
-            </a:r>
-            <a:r>
-              <a:rPr lang="pt-BR" sz="1200" kern="1200" dirty="0" err="1" smtClean="0">
-                <a:solidFill>
-                  <a:schemeClr val="tx1"/>
-                </a:solidFill>
-                <a:effectLst/>
-                <a:latin typeface="+mn-lt"/>
-                <a:ea typeface="+mn-ea"/>
-                <a:cs typeface="+mn-cs"/>
-              </a:rPr>
-              <a:t>etc</a:t>
-            </a:r>
-            <a:r>
-              <a:rPr lang="pt-BR" sz="1200" kern="1200" dirty="0" smtClean="0">
-                <a:solidFill>
-                  <a:schemeClr val="tx1"/>
-                </a:solidFill>
-                <a:effectLst/>
-                <a:latin typeface="+mn-lt"/>
-                <a:ea typeface="+mn-ea"/>
-                <a:cs typeface="+mn-cs"/>
-              </a:rPr>
-              <a:t>; Redesenhar o rastreador para aceitar uma bicicleta como plataforma; Fazer operações de testes para validar o rastreamento</a:t>
+              <a:t>Desta forma, a intenção de contratação varia de acordo com esses gráficos.</a:t>
             </a:r>
           </a:p>
           <a:p>
@@ -2675,7 +3157,7 @@
     </p:spTree>
     <p:extLst>
       <p:ext uri="{BB962C8B-B14F-4D97-AF65-F5344CB8AC3E}">
-        <p14:creationId xmlns:p14="http://schemas.microsoft.com/office/powerpoint/2010/main" val="1382097954"/>
+        <p14:creationId xmlns:p14="http://schemas.microsoft.com/office/powerpoint/2010/main" val="1605768588"/>
       </p:ext>
     </p:extLst>
   </p:cSld>
@@ -2818,7 +3300,7 @@
           <a:p>
             <a:fld id="{081C23F6-F72F-4C25-8F93-0EC9AD9DA484}" type="datetimeFigureOut">
               <a:rPr lang="pt-BR" smtClean="0"/>
-              <a:t>28/10/2019</a:t>
+              <a:t>29/10/2019</a:t>
             </a:fld>
             <a:endParaRPr lang="pt-BR"/>
           </a:p>
@@ -2988,7 +3470,7 @@
           <a:p>
             <a:fld id="{081C23F6-F72F-4C25-8F93-0EC9AD9DA484}" type="datetimeFigureOut">
               <a:rPr lang="pt-BR" smtClean="0"/>
-              <a:t>28/10/2019</a:t>
+              <a:t>29/10/2019</a:t>
             </a:fld>
             <a:endParaRPr lang="pt-BR"/>
           </a:p>
@@ -3168,7 +3650,7 @@
           <a:p>
             <a:fld id="{081C23F6-F72F-4C25-8F93-0EC9AD9DA484}" type="datetimeFigureOut">
               <a:rPr lang="pt-BR" smtClean="0"/>
-              <a:t>28/10/2019</a:t>
+              <a:t>29/10/2019</a:t>
             </a:fld>
             <a:endParaRPr lang="pt-BR"/>
           </a:p>
@@ -3338,7 +3820,7 @@
           <a:p>
             <a:fld id="{081C23F6-F72F-4C25-8F93-0EC9AD9DA484}" type="datetimeFigureOut">
               <a:rPr lang="pt-BR" smtClean="0"/>
-              <a:t>28/10/2019</a:t>
+              <a:t>29/10/2019</a:t>
             </a:fld>
             <a:endParaRPr lang="pt-BR"/>
           </a:p>
@@ -3584,7 +4066,7 @@
           <a:p>
             <a:fld id="{081C23F6-F72F-4C25-8F93-0EC9AD9DA484}" type="datetimeFigureOut">
               <a:rPr lang="pt-BR" smtClean="0"/>
-              <a:t>28/10/2019</a:t>
+              <a:t>29/10/2019</a:t>
             </a:fld>
             <a:endParaRPr lang="pt-BR"/>
           </a:p>
@@ -3816,7 +4298,7 @@
           <a:p>
             <a:fld id="{081C23F6-F72F-4C25-8F93-0EC9AD9DA484}" type="datetimeFigureOut">
               <a:rPr lang="pt-BR" smtClean="0"/>
-              <a:t>28/10/2019</a:t>
+              <a:t>29/10/2019</a:t>
             </a:fld>
             <a:endParaRPr lang="pt-BR"/>
           </a:p>
@@ -4183,7 +4665,7 @@
           <a:p>
             <a:fld id="{081C23F6-F72F-4C25-8F93-0EC9AD9DA484}" type="datetimeFigureOut">
               <a:rPr lang="pt-BR" smtClean="0"/>
-              <a:t>28/10/2019</a:t>
+              <a:t>29/10/2019</a:t>
             </a:fld>
             <a:endParaRPr lang="pt-BR"/>
           </a:p>
@@ -4301,7 +4783,7 @@
           <a:p>
             <a:fld id="{081C23F6-F72F-4C25-8F93-0EC9AD9DA484}" type="datetimeFigureOut">
               <a:rPr lang="pt-BR" smtClean="0"/>
-              <a:t>28/10/2019</a:t>
+              <a:t>29/10/2019</a:t>
             </a:fld>
             <a:endParaRPr lang="pt-BR"/>
           </a:p>
@@ -4396,7 +4878,7 @@
           <a:p>
             <a:fld id="{081C23F6-F72F-4C25-8F93-0EC9AD9DA484}" type="datetimeFigureOut">
               <a:rPr lang="pt-BR" smtClean="0"/>
-              <a:t>28/10/2019</a:t>
+              <a:t>29/10/2019</a:t>
             </a:fld>
             <a:endParaRPr lang="pt-BR"/>
           </a:p>
@@ -4673,7 +5155,7 @@
           <a:p>
             <a:fld id="{081C23F6-F72F-4C25-8F93-0EC9AD9DA484}" type="datetimeFigureOut">
               <a:rPr lang="pt-BR" smtClean="0"/>
-              <a:t>28/10/2019</a:t>
+              <a:t>29/10/2019</a:t>
             </a:fld>
             <a:endParaRPr lang="pt-BR"/>
           </a:p>
@@ -4926,7 +5408,7 @@
           <a:p>
             <a:fld id="{081C23F6-F72F-4C25-8F93-0EC9AD9DA484}" type="datetimeFigureOut">
               <a:rPr lang="pt-BR" smtClean="0"/>
-              <a:t>28/10/2019</a:t>
+              <a:t>29/10/2019</a:t>
             </a:fld>
             <a:endParaRPr lang="pt-BR"/>
           </a:p>
@@ -5251,7 +5733,7 @@
           <a:p>
             <a:fld id="{081C23F6-F72F-4C25-8F93-0EC9AD9DA484}" type="datetimeFigureOut">
               <a:rPr lang="pt-BR" smtClean="0"/>
-              <a:t>28/10/2019</a:t>
+              <a:t>29/10/2019</a:t>
             </a:fld>
             <a:endParaRPr lang="pt-BR" dirty="0"/>
           </a:p>
@@ -6117,7 +6599,7 @@
               <a:rPr lang="pt-BR" dirty="0" smtClean="0">
                 <a:latin typeface="Pathway Gothic One" panose="02000506050000020004" pitchFamily="2" charset="0"/>
               </a:rPr>
-              <a:t>BUDGET</a:t>
+              <a:t>PLANEJAMENTO</a:t>
             </a:r>
             <a:endParaRPr lang="pt-BR" dirty="0">
               <a:latin typeface="Pathway Gothic One" panose="02000506050000020004" pitchFamily="2" charset="0"/>
@@ -6142,47 +6624,26 @@
           </a:bodyPr>
           <a:lstStyle/>
           <a:p>
+            <a:pPr marL="0" indent="0">
+              <a:buNone/>
+            </a:pPr>
             <a:r>
               <a:rPr lang="pt-BR" dirty="0" smtClean="0"/>
-              <a:t>Redesenho </a:t>
+              <a:t>Validar com cliente</a:t>
+            </a:r>
+          </a:p>
+          <a:p>
+            <a:pPr marL="0" indent="0">
+              <a:buNone/>
+            </a:pPr>
+            <a:r>
+              <a:rPr lang="pt-BR" dirty="0"/>
+              <a:t>	</a:t>
             </a:r>
             <a:r>
               <a:rPr lang="pt-BR" dirty="0" smtClean="0"/>
-              <a:t>do </a:t>
-            </a:r>
-            <a:r>
-              <a:rPr lang="pt-BR" dirty="0" smtClean="0"/>
-              <a:t>rastreador</a:t>
-            </a:r>
-            <a:br>
-              <a:rPr lang="pt-BR" dirty="0" smtClean="0"/>
-            </a:br>
-            <a:r>
-              <a:rPr lang="pt-BR" sz="1600" dirty="0" smtClean="0"/>
-              <a:t>(técnica)</a:t>
-            </a:r>
-            <a:endParaRPr lang="pt-BR" sz="1600" dirty="0" smtClean="0"/>
-          </a:p>
-          <a:p>
-            <a:endParaRPr lang="pt-BR" dirty="0" smtClean="0"/>
-          </a:p>
-          <a:p>
-            <a:r>
-              <a:rPr lang="pt-BR" dirty="0" smtClean="0"/>
-              <a:t>Integrações com </a:t>
-            </a:r>
-            <a:r>
-              <a:rPr lang="pt-BR" dirty="0"/>
-              <a:t>seguradoras</a:t>
-            </a:r>
-            <a:br>
-              <a:rPr lang="pt-BR" dirty="0"/>
-            </a:br>
-            <a:r>
-              <a:rPr lang="pt-BR" sz="1600" dirty="0" smtClean="0"/>
-              <a:t>(TI)</a:t>
-            </a:r>
-            <a:endParaRPr lang="pt-BR" sz="1600" dirty="0"/>
+              <a:t>Pesquisa quantitativa</a:t>
+            </a:r>
           </a:p>
           <a:p>
             <a:pPr marL="0" indent="0">
@@ -6191,38 +6652,36 @@
             <a:endParaRPr lang="pt-BR" dirty="0" smtClean="0"/>
           </a:p>
           <a:p>
+            <a:pPr marL="0" indent="0">
+              <a:buNone/>
+            </a:pPr>
             <a:r>
               <a:rPr lang="pt-BR" dirty="0" smtClean="0"/>
-              <a:t>Marketing</a:t>
-            </a:r>
-            <a:br>
+              <a:t>Levantar parceiros</a:t>
+            </a:r>
+          </a:p>
+          <a:p>
+            <a:pPr marL="0" indent="0">
+              <a:buNone/>
+            </a:pPr>
+            <a:r>
               <a:rPr lang="pt-BR" dirty="0" smtClean="0"/>
-            </a:br>
+              <a:t>	Velo </a:t>
+            </a:r>
+          </a:p>
+          <a:p>
+            <a:pPr marL="0" indent="0">
+              <a:buNone/>
+            </a:pPr>
+            <a:r>
+              <a:rPr lang="pt-BR" dirty="0"/>
+              <a:t>	</a:t>
+            </a:r>
+            <a:r>
+              <a:rPr lang="pt-BR" dirty="0" err="1" smtClean="0"/>
+              <a:t>Kakau</a:t>
+            </a:r>
             <a:endParaRPr lang="pt-BR" dirty="0" smtClean="0"/>
-          </a:p>
-          <a:p>
-            <a:r>
-              <a:rPr lang="pt-BR" dirty="0" smtClean="0"/>
-              <a:t>Treinamento para áreas </a:t>
-            </a:r>
-            <a:r>
-              <a:rPr lang="pt-BR" dirty="0" smtClean="0"/>
-              <a:t>e parceiros</a:t>
-            </a:r>
-            <a:r>
-              <a:rPr lang="pt-BR" dirty="0"/>
-              <a:t/>
-            </a:r>
-            <a:br>
-              <a:rPr lang="pt-BR" dirty="0"/>
-            </a:br>
-            <a:r>
-              <a:rPr lang="pt-BR" sz="1600" dirty="0"/>
-              <a:t>(técnica)</a:t>
-            </a:r>
-          </a:p>
-          <a:p>
-            <a:endParaRPr lang="pt-BR" dirty="0"/>
           </a:p>
         </p:txBody>
       </p:sp>
@@ -6235,7 +6694,7 @@
         <p:spPr>
           <a:xfrm>
             <a:off x="0" y="-37322"/>
-            <a:ext cx="1178528" cy="461665"/>
+            <a:ext cx="968535" cy="461665"/>
           </a:xfrm>
           <a:prstGeom prst="rect">
             <a:avLst/>
@@ -6251,7 +6710,7 @@
               <a:rPr lang="pt-BR" sz="2400" dirty="0" smtClean="0">
                 <a:latin typeface="Pathway Gothic One" panose="02000506050000020004" pitchFamily="2" charset="0"/>
               </a:rPr>
-              <a:t>| QUANTO |</a:t>
+              <a:t>| COMO |</a:t>
             </a:r>
             <a:endParaRPr lang="pt-BR" sz="2400" dirty="0">
               <a:latin typeface="Pathway Gothic One" panose="02000506050000020004" pitchFamily="2" charset="0"/>
@@ -6259,10 +6718,292 @@
           </a:p>
         </p:txBody>
       </p:sp>
+      <p:grpSp>
+        <p:nvGrpSpPr>
+          <p:cNvPr id="14" name="Grupo 13"/>
+          <p:cNvGrpSpPr/>
+          <p:nvPr/>
+        </p:nvGrpSpPr>
+        <p:grpSpPr>
+          <a:xfrm>
+            <a:off x="8799443" y="1825625"/>
+            <a:ext cx="2554357" cy="2557528"/>
+            <a:chOff x="8799443" y="1825625"/>
+            <a:chExt cx="2554357" cy="2557528"/>
+          </a:xfrm>
+        </p:grpSpPr>
+        <p:grpSp>
+          <p:nvGrpSpPr>
+            <p:cNvPr id="9" name="Grupo 8"/>
+            <p:cNvGrpSpPr/>
+            <p:nvPr/>
+          </p:nvGrpSpPr>
+          <p:grpSpPr>
+            <a:xfrm>
+              <a:off x="8799443" y="1825625"/>
+              <a:ext cx="2554357" cy="698914"/>
+              <a:chOff x="7573617" y="1825625"/>
+              <a:chExt cx="2554357" cy="698914"/>
+            </a:xfrm>
+          </p:grpSpPr>
+          <p:sp>
+            <p:nvSpPr>
+              <p:cNvPr id="7" name="Retângulo 6"/>
+              <p:cNvSpPr/>
+              <p:nvPr/>
+            </p:nvSpPr>
+            <p:spPr>
+              <a:xfrm>
+                <a:off x="7573617" y="1825625"/>
+                <a:ext cx="2554357" cy="698914"/>
+              </a:xfrm>
+              <a:prstGeom prst="rect">
+                <a:avLst/>
+              </a:prstGeom>
+              <a:solidFill>
+                <a:schemeClr val="bg1"/>
+              </a:solidFill>
+            </p:spPr>
+            <p:style>
+              <a:lnRef idx="2">
+                <a:schemeClr val="accent1">
+                  <a:shade val="50000"/>
+                </a:schemeClr>
+              </a:lnRef>
+              <a:fillRef idx="1">
+                <a:schemeClr val="accent1"/>
+              </a:fillRef>
+              <a:effectRef idx="0">
+                <a:schemeClr val="accent1"/>
+              </a:effectRef>
+              <a:fontRef idx="minor">
+                <a:schemeClr val="lt1"/>
+              </a:fontRef>
+            </p:style>
+            <p:txBody>
+              <a:bodyPr rtlCol="0" anchor="ctr"/>
+              <a:lstStyle/>
+              <a:p>
+                <a:pPr algn="ctr"/>
+                <a:endParaRPr lang="pt-BR"/>
+              </a:p>
+            </p:txBody>
+          </p:sp>
+          <p:pic>
+            <p:nvPicPr>
+              <p:cNvPr id="6" name="Picture 2" descr="https://veloseguro.com/wp-content/uploads/2018/12/logo-velo-seguro-nova.png"/>
+              <p:cNvPicPr>
+                <a:picLocks noChangeAspect="1" noChangeArrowheads="1"/>
+              </p:cNvPicPr>
+              <p:nvPr/>
+            </p:nvPicPr>
+            <p:blipFill>
+              <a:blip r:embed="rId3">
+                <a:extLst>
+                  <a:ext uri="{28A0092B-C50C-407E-A947-70E740481C1C}">
+                    <a14:useLocalDpi xmlns:a14="http://schemas.microsoft.com/office/drawing/2010/main" val="0"/>
+                  </a:ext>
+                </a:extLst>
+              </a:blip>
+              <a:srcRect/>
+              <a:stretch>
+                <a:fillRect/>
+              </a:stretch>
+            </p:blipFill>
+            <p:spPr bwMode="auto">
+              <a:xfrm>
+                <a:off x="7898295" y="1917906"/>
+                <a:ext cx="1905000" cy="514351"/>
+              </a:xfrm>
+              <a:prstGeom prst="rect">
+                <a:avLst/>
+              </a:prstGeom>
+              <a:noFill/>
+              <a:extLst>
+                <a:ext uri="{909E8E84-426E-40DD-AFC4-6F175D3DCCD1}">
+                  <a14:hiddenFill xmlns:a14="http://schemas.microsoft.com/office/drawing/2010/main">
+                    <a:solidFill>
+                      <a:srgbClr val="FFFFFF"/>
+                    </a:solidFill>
+                  </a14:hiddenFill>
+                </a:ext>
+              </a:extLst>
+            </p:spPr>
+          </p:pic>
+        </p:grpSp>
+        <p:grpSp>
+          <p:nvGrpSpPr>
+            <p:cNvPr id="11" name="Grupo 10"/>
+            <p:cNvGrpSpPr/>
+            <p:nvPr/>
+          </p:nvGrpSpPr>
+          <p:grpSpPr>
+            <a:xfrm>
+              <a:off x="8799443" y="3314908"/>
+              <a:ext cx="2554357" cy="698914"/>
+              <a:chOff x="7667486" y="4598297"/>
+              <a:chExt cx="2554357" cy="698914"/>
+            </a:xfrm>
+          </p:grpSpPr>
+          <p:sp>
+            <p:nvSpPr>
+              <p:cNvPr id="10" name="Retângulo 9"/>
+              <p:cNvSpPr/>
+              <p:nvPr/>
+            </p:nvSpPr>
+            <p:spPr>
+              <a:xfrm>
+                <a:off x="7667486" y="4598297"/>
+                <a:ext cx="2554357" cy="698914"/>
+              </a:xfrm>
+              <a:prstGeom prst="rect">
+                <a:avLst/>
+              </a:prstGeom>
+            </p:spPr>
+            <p:style>
+              <a:lnRef idx="2">
+                <a:schemeClr val="accent1">
+                  <a:shade val="50000"/>
+                </a:schemeClr>
+              </a:lnRef>
+              <a:fillRef idx="1">
+                <a:schemeClr val="accent1"/>
+              </a:fillRef>
+              <a:effectRef idx="0">
+                <a:schemeClr val="accent1"/>
+              </a:effectRef>
+              <a:fontRef idx="minor">
+                <a:schemeClr val="lt1"/>
+              </a:fontRef>
+            </p:style>
+            <p:txBody>
+              <a:bodyPr rtlCol="0" anchor="ctr"/>
+              <a:lstStyle/>
+              <a:p>
+                <a:pPr algn="ctr"/>
+                <a:endParaRPr lang="pt-BR"/>
+              </a:p>
+            </p:txBody>
+          </p:sp>
+          <p:pic>
+            <p:nvPicPr>
+              <p:cNvPr id="1028" name="Picture 4" descr="https://www.kakau.co/assets/logo_white@2x-82cf6f60481ee34d7fe7ddd430ddc0227d776634293e72bdca14d578618f5f79.png"/>
+              <p:cNvPicPr>
+                <a:picLocks noChangeAspect="1" noChangeArrowheads="1"/>
+              </p:cNvPicPr>
+              <p:nvPr/>
+            </p:nvPicPr>
+            <p:blipFill>
+              <a:blip r:embed="rId4">
+                <a:extLst>
+                  <a:ext uri="{28A0092B-C50C-407E-A947-70E740481C1C}">
+                    <a14:useLocalDpi xmlns:a14="http://schemas.microsoft.com/office/drawing/2010/main" val="0"/>
+                  </a:ext>
+                </a:extLst>
+              </a:blip>
+              <a:srcRect/>
+              <a:stretch>
+                <a:fillRect/>
+              </a:stretch>
+            </p:blipFill>
+            <p:spPr bwMode="auto">
+              <a:xfrm>
+                <a:off x="7824786" y="4708644"/>
+                <a:ext cx="2239756" cy="478219"/>
+              </a:xfrm>
+              <a:prstGeom prst="rect">
+                <a:avLst/>
+              </a:prstGeom>
+              <a:noFill/>
+              <a:extLst>
+                <a:ext uri="{909E8E84-426E-40DD-AFC4-6F175D3DCCD1}">
+                  <a14:hiddenFill xmlns:a14="http://schemas.microsoft.com/office/drawing/2010/main">
+                    <a:solidFill>
+                      <a:srgbClr val="FFFFFF"/>
+                    </a:solidFill>
+                  </a14:hiddenFill>
+                </a:ext>
+              </a:extLst>
+            </p:spPr>
+          </p:pic>
+        </p:grpSp>
+        <p:sp>
+          <p:nvSpPr>
+            <p:cNvPr id="15" name="CaixaDeTexto 14"/>
+            <p:cNvSpPr txBox="1"/>
+            <p:nvPr/>
+          </p:nvSpPr>
+          <p:spPr>
+            <a:xfrm>
+              <a:off x="9040920" y="2520812"/>
+              <a:ext cx="2071401" cy="369332"/>
+            </a:xfrm>
+            <a:prstGeom prst="rect">
+              <a:avLst/>
+            </a:prstGeom>
+            <a:noFill/>
+          </p:spPr>
+          <p:txBody>
+            <a:bodyPr wrap="none" rtlCol="0">
+              <a:spAutoFit/>
+            </a:bodyPr>
+            <a:lstStyle/>
+            <a:p>
+              <a:pPr algn="ctr"/>
+              <a:r>
+                <a:rPr lang="pt-BR" dirty="0" smtClean="0">
+                  <a:latin typeface="Pathway Gothic One" panose="02000506050000020004" pitchFamily="2" charset="0"/>
+                  <a:hlinkClick r:id="rId5"/>
+                </a:rPr>
+                <a:t>HTTPS://VELOSEGURO.COM/</a:t>
+              </a:r>
+              <a:endParaRPr lang="pt-BR" dirty="0">
+                <a:latin typeface="Pathway Gothic One" panose="02000506050000020004" pitchFamily="2" charset="0"/>
+              </a:endParaRPr>
+            </a:p>
+          </p:txBody>
+        </p:sp>
+        <p:sp>
+          <p:nvSpPr>
+            <p:cNvPr id="18" name="CaixaDeTexto 17"/>
+            <p:cNvSpPr txBox="1"/>
+            <p:nvPr/>
+          </p:nvSpPr>
+          <p:spPr>
+            <a:xfrm>
+              <a:off x="9102635" y="4013821"/>
+              <a:ext cx="1947969" cy="369332"/>
+            </a:xfrm>
+            <a:prstGeom prst="rect">
+              <a:avLst/>
+            </a:prstGeom>
+            <a:noFill/>
+          </p:spPr>
+          <p:txBody>
+            <a:bodyPr wrap="none" rtlCol="0">
+              <a:spAutoFit/>
+            </a:bodyPr>
+            <a:lstStyle/>
+            <a:p>
+              <a:pPr algn="ctr"/>
+              <a:r>
+                <a:rPr lang="pt-BR" dirty="0" smtClean="0">
+                  <a:latin typeface="Pathway Gothic One" panose="02000506050000020004" pitchFamily="2" charset="0"/>
+                  <a:hlinkClick r:id="rId6"/>
+                </a:rPr>
+                <a:t>HTTPS://WWW.KAKAU.CO/</a:t>
+              </a:r>
+              <a:endParaRPr lang="pt-BR" dirty="0">
+                <a:latin typeface="Pathway Gothic One" panose="02000506050000020004" pitchFamily="2" charset="0"/>
+              </a:endParaRPr>
+            </a:p>
+          </p:txBody>
+        </p:sp>
+      </p:grpSp>
     </p:spTree>
     <p:extLst>
       <p:ext uri="{BB962C8B-B14F-4D97-AF65-F5344CB8AC3E}">
-        <p14:creationId xmlns:p14="http://schemas.microsoft.com/office/powerpoint/2010/main" val="1574443318"/>
+        <p14:creationId xmlns:p14="http://schemas.microsoft.com/office/powerpoint/2010/main" val="3263096424"/>
       </p:ext>
     </p:extLst>
   </p:cSld>
@@ -6272,7 +7013,75 @@
   <p:timing>
     <p:tnLst>
       <p:par>
-        <p:cTn id="1" dur="indefinite" restart="never" nodeType="tmRoot"/>
+        <p:cTn id="1" dur="indefinite" restart="never" nodeType="tmRoot">
+          <p:childTnLst>
+            <p:seq concurrent="1" nextAc="seek">
+              <p:cTn id="2" dur="indefinite" nodeType="mainSeq">
+                <p:childTnLst>
+                  <p:par>
+                    <p:cTn id="3" fill="hold">
+                      <p:stCondLst>
+                        <p:cond delay="indefinite"/>
+                      </p:stCondLst>
+                      <p:childTnLst>
+                        <p:par>
+                          <p:cTn id="4" fill="hold">
+                            <p:stCondLst>
+                              <p:cond delay="0"/>
+                            </p:stCondLst>
+                            <p:childTnLst>
+                              <p:par>
+                                <p:cTn id="5" presetID="1" presetClass="entr" presetSubtype="0" fill="hold" nodeType="clickEffect">
+                                  <p:stCondLst>
+                                    <p:cond delay="0"/>
+                                  </p:stCondLst>
+                                  <p:childTnLst>
+                                    <p:set>
+                                      <p:cBhvr>
+                                        <p:cTn id="6" dur="1" fill="hold">
+                                          <p:stCondLst>
+                                            <p:cond delay="0"/>
+                                          </p:stCondLst>
+                                        </p:cTn>
+                                        <p:tgtEl>
+                                          <p:spTgt spid="14"/>
+                                        </p:tgtEl>
+                                        <p:attrNameLst>
+                                          <p:attrName>style.visibility</p:attrName>
+                                        </p:attrNameLst>
+                                      </p:cBhvr>
+                                      <p:to>
+                                        <p:strVal val="visible"/>
+                                      </p:to>
+                                    </p:set>
+                                  </p:childTnLst>
+                                </p:cTn>
+                              </p:par>
+                            </p:childTnLst>
+                          </p:cTn>
+                        </p:par>
+                      </p:childTnLst>
+                    </p:cTn>
+                  </p:par>
+                </p:childTnLst>
+              </p:cTn>
+              <p:prevCondLst>
+                <p:cond evt="onPrev" delay="0">
+                  <p:tgtEl>
+                    <p:sldTgt/>
+                  </p:tgtEl>
+                </p:cond>
+              </p:prevCondLst>
+              <p:nextCondLst>
+                <p:cond evt="onNext" delay="0">
+                  <p:tgtEl>
+                    <p:sldTgt/>
+                  </p:tgtEl>
+                </p:cond>
+              </p:nextCondLst>
+            </p:seq>
+          </p:childTnLst>
+        </p:cTn>
       </p:par>
     </p:tnLst>
   </p:timing>
@@ -6312,10 +7121,211 @@
           <a:lstStyle/>
           <a:p>
             <a:r>
-              <a:rPr lang="pt-BR" dirty="0" smtClean="0"/>
-              <a:t>RESULTADOS ESPERADOS</a:t>
-            </a:r>
-            <a:endParaRPr lang="pt-BR" dirty="0"/>
+              <a:rPr lang="pt-BR" dirty="0" smtClean="0">
+                <a:latin typeface="Pathway Gothic One" panose="02000506050000020004" pitchFamily="2" charset="0"/>
+              </a:rPr>
+              <a:t>PLANEJAMENTO</a:t>
+            </a:r>
+            <a:endParaRPr lang="pt-BR" dirty="0">
+              <a:latin typeface="Pathway Gothic One" panose="02000506050000020004" pitchFamily="2" charset="0"/>
+            </a:endParaRPr>
+          </a:p>
+        </p:txBody>
+      </p:sp>
+      <p:sp>
+        <p:nvSpPr>
+          <p:cNvPr id="3" name="Espaço Reservado para Conteúdo 2"/>
+          <p:cNvSpPr>
+            <a:spLocks noGrp="1"/>
+          </p:cNvSpPr>
+          <p:nvPr>
+            <p:ph idx="1"/>
+          </p:nvPr>
+        </p:nvSpPr>
+        <p:spPr/>
+        <p:txBody>
+          <a:bodyPr>
+            <a:normAutofit fontScale="92500" lnSpcReduction="20000"/>
+          </a:bodyPr>
+          <a:lstStyle/>
+          <a:p>
+            <a:pPr marL="0" indent="0">
+              <a:buNone/>
+            </a:pPr>
+            <a:endParaRPr lang="pt-BR" dirty="0" smtClean="0"/>
+          </a:p>
+          <a:p>
+            <a:pPr marL="0" indent="0">
+              <a:buNone/>
+            </a:pPr>
+            <a:r>
+              <a:rPr lang="pt-BR" sz="3600" dirty="0" smtClean="0"/>
+              <a:t>Campanha de marketing</a:t>
+            </a:r>
+          </a:p>
+          <a:p>
+            <a:pPr marL="0" indent="0">
+              <a:buNone/>
+            </a:pPr>
+            <a:endParaRPr lang="pt-BR" sz="3600" dirty="0" smtClean="0"/>
+          </a:p>
+          <a:p>
+            <a:pPr marL="0" indent="0">
+              <a:buNone/>
+            </a:pPr>
+            <a:endParaRPr lang="pt-BR" sz="3600" dirty="0"/>
+          </a:p>
+          <a:p>
+            <a:pPr marL="0" indent="0">
+              <a:buNone/>
+            </a:pPr>
+            <a:r>
+              <a:rPr lang="pt-BR" sz="3600" dirty="0" smtClean="0"/>
+              <a:t>Parte técnica</a:t>
+            </a:r>
+          </a:p>
+          <a:p>
+            <a:pPr marL="0" indent="0">
+              <a:buNone/>
+            </a:pPr>
+            <a:endParaRPr lang="pt-BR" sz="3600" dirty="0" smtClean="0"/>
+          </a:p>
+          <a:p>
+            <a:pPr marL="0" indent="0">
+              <a:buNone/>
+            </a:pPr>
+            <a:r>
+              <a:rPr lang="pt-BR" sz="3600" dirty="0" smtClean="0"/>
+              <a:t>	</a:t>
+            </a:r>
+            <a:r>
+              <a:rPr lang="pt-BR" sz="3600" dirty="0" err="1" smtClean="0"/>
+              <a:t>Re-engenharia</a:t>
+            </a:r>
+            <a:r>
+              <a:rPr lang="pt-BR" sz="3600" dirty="0" smtClean="0"/>
+              <a:t> do rastreador</a:t>
+            </a:r>
+          </a:p>
+          <a:p>
+            <a:pPr marL="0" indent="0">
+              <a:buNone/>
+            </a:pPr>
+            <a:endParaRPr lang="pt-BR" sz="3600" dirty="0" smtClean="0"/>
+          </a:p>
+          <a:p>
+            <a:pPr marL="0" indent="0">
+              <a:buNone/>
+            </a:pPr>
+            <a:r>
+              <a:rPr lang="pt-BR" sz="3600" dirty="0" smtClean="0"/>
+              <a:t>	Beta-</a:t>
+            </a:r>
+            <a:r>
+              <a:rPr lang="pt-BR" sz="3600" dirty="0" err="1" smtClean="0"/>
+              <a:t>Testing</a:t>
+            </a:r>
+            <a:r>
+              <a:rPr lang="pt-BR" sz="3600" dirty="0" smtClean="0"/>
+              <a:t> – Operações assistidas</a:t>
+            </a:r>
+          </a:p>
+        </p:txBody>
+      </p:sp>
+      <p:sp>
+        <p:nvSpPr>
+          <p:cNvPr id="4" name="Retângulo 3"/>
+          <p:cNvSpPr/>
+          <p:nvPr/>
+        </p:nvSpPr>
+        <p:spPr>
+          <a:xfrm>
+            <a:off x="0" y="-37322"/>
+            <a:ext cx="968535" cy="461665"/>
+          </a:xfrm>
+          <a:prstGeom prst="rect">
+            <a:avLst/>
+          </a:prstGeom>
+        </p:spPr>
+        <p:txBody>
+          <a:bodyPr wrap="none">
+            <a:spAutoFit/>
+          </a:bodyPr>
+          <a:lstStyle/>
+          <a:p>
+            <a:r>
+              <a:rPr lang="pt-BR" sz="2400" dirty="0" smtClean="0">
+                <a:latin typeface="Pathway Gothic One" panose="02000506050000020004" pitchFamily="2" charset="0"/>
+              </a:rPr>
+              <a:t>| COMO |</a:t>
+            </a:r>
+            <a:endParaRPr lang="pt-BR" sz="2400" dirty="0">
+              <a:latin typeface="Pathway Gothic One" panose="02000506050000020004" pitchFamily="2" charset="0"/>
+            </a:endParaRPr>
+          </a:p>
+        </p:txBody>
+      </p:sp>
+    </p:spTree>
+    <p:extLst>
+      <p:ext uri="{BB962C8B-B14F-4D97-AF65-F5344CB8AC3E}">
+        <p14:creationId xmlns:p14="http://schemas.microsoft.com/office/powerpoint/2010/main" val="632305710"/>
+      </p:ext>
+    </p:extLst>
+  </p:cSld>
+  <p:clrMapOvr>
+    <a:masterClrMapping/>
+  </p:clrMapOvr>
+  <p:timing>
+    <p:tnLst>
+      <p:par>
+        <p:cTn id="1" dur="indefinite" restart="never" nodeType="tmRoot"/>
+      </p:par>
+    </p:tnLst>
+  </p:timing>
+</p:sld>
+</file>
+
+<file path=ppt/slides/slide12.xml><?xml version="1.0" encoding="utf-8"?>
+<p:sld xmlns:a="http://schemas.openxmlformats.org/drawingml/2006/main" xmlns:r="http://schemas.openxmlformats.org/officeDocument/2006/relationships" xmlns:p="http://schemas.openxmlformats.org/presentationml/2006/main">
+  <p:cSld>
+    <p:spTree>
+      <p:nvGrpSpPr>
+        <p:cNvPr id="1" name=""/>
+        <p:cNvGrpSpPr/>
+        <p:nvPr/>
+      </p:nvGrpSpPr>
+      <p:grpSpPr>
+        <a:xfrm>
+          <a:off x="0" y="0"/>
+          <a:ext cx="0" cy="0"/>
+          <a:chOff x="0" y="0"/>
+          <a:chExt cx="0" cy="0"/>
+        </a:xfrm>
+      </p:grpSpPr>
+      <p:sp>
+        <p:nvSpPr>
+          <p:cNvPr id="2" name="Título 1"/>
+          <p:cNvSpPr>
+            <a:spLocks noGrp="1"/>
+          </p:cNvSpPr>
+          <p:nvPr>
+            <p:ph type="title"/>
+          </p:nvPr>
+        </p:nvSpPr>
+        <p:spPr/>
+        <p:txBody>
+          <a:bodyPr/>
+          <a:lstStyle/>
+          <a:p>
+            <a:r>
+              <a:rPr lang="pt-BR" dirty="0" smtClean="0">
+                <a:latin typeface="Pathway Gothic One" panose="02000506050000020004" pitchFamily="2" charset="0"/>
+              </a:rPr>
+              <a:t>BUDGET</a:t>
+            </a:r>
+            <a:endParaRPr lang="pt-BR" dirty="0">
+              <a:latin typeface="Pathway Gothic One" panose="02000506050000020004" pitchFamily="2" charset="0"/>
+            </a:endParaRPr>
           </a:p>
         </p:txBody>
       </p:sp>
@@ -6338,6 +7348,187 @@
           <a:p>
             <a:r>
               <a:rPr lang="pt-BR" dirty="0" smtClean="0"/>
+              <a:t>Redesenho do rastreador</a:t>
+            </a:r>
+            <a:br>
+              <a:rPr lang="pt-BR" dirty="0" smtClean="0"/>
+            </a:br>
+            <a:r>
+              <a:rPr lang="pt-BR" sz="1600" dirty="0" smtClean="0"/>
+              <a:t>(técnica)</a:t>
+            </a:r>
+          </a:p>
+          <a:p>
+            <a:endParaRPr lang="pt-BR" dirty="0" smtClean="0"/>
+          </a:p>
+          <a:p>
+            <a:r>
+              <a:rPr lang="pt-BR" dirty="0" smtClean="0"/>
+              <a:t>Integrações com </a:t>
+            </a:r>
+            <a:r>
+              <a:rPr lang="pt-BR" dirty="0"/>
+              <a:t>seguradoras</a:t>
+            </a:r>
+            <a:br>
+              <a:rPr lang="pt-BR" dirty="0"/>
+            </a:br>
+            <a:r>
+              <a:rPr lang="pt-BR" sz="1600" dirty="0" smtClean="0"/>
+              <a:t>(TI)</a:t>
+            </a:r>
+            <a:endParaRPr lang="pt-BR" sz="1600" dirty="0"/>
+          </a:p>
+          <a:p>
+            <a:pPr marL="0" indent="0">
+              <a:buNone/>
+            </a:pPr>
+            <a:endParaRPr lang="pt-BR" dirty="0" smtClean="0"/>
+          </a:p>
+          <a:p>
+            <a:r>
+              <a:rPr lang="pt-BR" dirty="0" smtClean="0"/>
+              <a:t>Marketing</a:t>
+            </a:r>
+            <a:br>
+              <a:rPr lang="pt-BR" dirty="0" smtClean="0"/>
+            </a:br>
+            <a:endParaRPr lang="pt-BR" dirty="0" smtClean="0"/>
+          </a:p>
+          <a:p>
+            <a:r>
+              <a:rPr lang="pt-BR" dirty="0" smtClean="0"/>
+              <a:t>Treinamento para áreas e parceiros</a:t>
+            </a:r>
+            <a:r>
+              <a:rPr lang="pt-BR" dirty="0"/>
+              <a:t/>
+            </a:r>
+            <a:br>
+              <a:rPr lang="pt-BR" dirty="0"/>
+            </a:br>
+            <a:r>
+              <a:rPr lang="pt-BR" sz="1600" dirty="0"/>
+              <a:t>(técnica)</a:t>
+            </a:r>
+          </a:p>
+          <a:p>
+            <a:endParaRPr lang="pt-BR" dirty="0"/>
+          </a:p>
+        </p:txBody>
+      </p:sp>
+      <p:sp>
+        <p:nvSpPr>
+          <p:cNvPr id="4" name="Retângulo 3"/>
+          <p:cNvSpPr/>
+          <p:nvPr/>
+        </p:nvSpPr>
+        <p:spPr>
+          <a:xfrm>
+            <a:off x="0" y="-37322"/>
+            <a:ext cx="1178528" cy="461665"/>
+          </a:xfrm>
+          <a:prstGeom prst="rect">
+            <a:avLst/>
+          </a:prstGeom>
+        </p:spPr>
+        <p:txBody>
+          <a:bodyPr wrap="none">
+            <a:spAutoFit/>
+          </a:bodyPr>
+          <a:lstStyle/>
+          <a:p>
+            <a:r>
+              <a:rPr lang="pt-BR" sz="2400" dirty="0" smtClean="0">
+                <a:latin typeface="Pathway Gothic One" panose="02000506050000020004" pitchFamily="2" charset="0"/>
+              </a:rPr>
+              <a:t>| QUANTO |</a:t>
+            </a:r>
+            <a:endParaRPr lang="pt-BR" sz="2400" dirty="0">
+              <a:latin typeface="Pathway Gothic One" panose="02000506050000020004" pitchFamily="2" charset="0"/>
+            </a:endParaRPr>
+          </a:p>
+        </p:txBody>
+      </p:sp>
+    </p:spTree>
+    <p:extLst>
+      <p:ext uri="{BB962C8B-B14F-4D97-AF65-F5344CB8AC3E}">
+        <p14:creationId xmlns:p14="http://schemas.microsoft.com/office/powerpoint/2010/main" val="1574443318"/>
+      </p:ext>
+    </p:extLst>
+  </p:cSld>
+  <p:clrMapOvr>
+    <a:masterClrMapping/>
+  </p:clrMapOvr>
+  <p:timing>
+    <p:tnLst>
+      <p:par>
+        <p:cTn id="1" dur="indefinite" restart="never" nodeType="tmRoot"/>
+      </p:par>
+    </p:tnLst>
+  </p:timing>
+</p:sld>
+</file>
+
+<file path=ppt/slides/slide13.xml><?xml version="1.0" encoding="utf-8"?>
+<p:sld xmlns:a="http://schemas.openxmlformats.org/drawingml/2006/main" xmlns:r="http://schemas.openxmlformats.org/officeDocument/2006/relationships" xmlns:p="http://schemas.openxmlformats.org/presentationml/2006/main">
+  <p:cSld>
+    <p:spTree>
+      <p:nvGrpSpPr>
+        <p:cNvPr id="1" name=""/>
+        <p:cNvGrpSpPr/>
+        <p:nvPr/>
+      </p:nvGrpSpPr>
+      <p:grpSpPr>
+        <a:xfrm>
+          <a:off x="0" y="0"/>
+          <a:ext cx="0" cy="0"/>
+          <a:chOff x="0" y="0"/>
+          <a:chExt cx="0" cy="0"/>
+        </a:xfrm>
+      </p:grpSpPr>
+      <p:sp>
+        <p:nvSpPr>
+          <p:cNvPr id="2" name="Título 1"/>
+          <p:cNvSpPr>
+            <a:spLocks noGrp="1"/>
+          </p:cNvSpPr>
+          <p:nvPr>
+            <p:ph type="title"/>
+          </p:nvPr>
+        </p:nvSpPr>
+        <p:spPr/>
+        <p:txBody>
+          <a:bodyPr/>
+          <a:lstStyle/>
+          <a:p>
+            <a:r>
+              <a:rPr lang="pt-BR" dirty="0" smtClean="0"/>
+              <a:t>RESULTADOS ESPERADOS</a:t>
+            </a:r>
+            <a:endParaRPr lang="pt-BR" dirty="0"/>
+          </a:p>
+        </p:txBody>
+      </p:sp>
+      <p:sp>
+        <p:nvSpPr>
+          <p:cNvPr id="3" name="Espaço Reservado para Conteúdo 2"/>
+          <p:cNvSpPr>
+            <a:spLocks noGrp="1"/>
+          </p:cNvSpPr>
+          <p:nvPr>
+            <p:ph idx="1"/>
+          </p:nvPr>
+        </p:nvSpPr>
+        <p:spPr/>
+        <p:txBody>
+          <a:bodyPr>
+            <a:normAutofit/>
+          </a:bodyPr>
+          <a:lstStyle/>
+          <a:p>
+            <a:r>
+              <a:rPr lang="pt-BR" dirty="0" smtClean="0"/>
               <a:t>Novo nicho de </a:t>
             </a:r>
             <a:r>
@@ -6393,11 +7584,7 @@
             <a:pPr lvl="1"/>
             <a:r>
               <a:rPr lang="pt-BR" dirty="0" smtClean="0"/>
-              <a:t>Mudança </a:t>
-            </a:r>
-            <a:r>
-              <a:rPr lang="pt-BR" dirty="0" smtClean="0"/>
-              <a:t>do </a:t>
+              <a:t>Mudança do </a:t>
             </a:r>
             <a:r>
               <a:rPr lang="pt-BR" dirty="0" err="1" smtClean="0"/>
@@ -6463,7 +7650,7 @@
 </p:sld>
 </file>
 
-<file path=ppt/slides/slide12.xml><?xml version="1.0" encoding="utf-8"?>
+<file path=ppt/slides/slide14.xml><?xml version="1.0" encoding="utf-8"?>
 <p:sld xmlns:a="http://schemas.openxmlformats.org/drawingml/2006/main" xmlns:r="http://schemas.openxmlformats.org/officeDocument/2006/relationships" xmlns:p="http://schemas.openxmlformats.org/presentationml/2006/main">
   <p:cSld>
     <p:spTree>
@@ -6529,7 +7716,7 @@
 </p:sld>
 </file>
 
-<file path=ppt/slides/slide13.xml><?xml version="1.0" encoding="utf-8"?>
+<file path=ppt/slides/slide15.xml><?xml version="1.0" encoding="utf-8"?>
 <p:sld xmlns:a="http://schemas.openxmlformats.org/drawingml/2006/main" xmlns:r="http://schemas.openxmlformats.org/officeDocument/2006/relationships" xmlns:p="http://schemas.openxmlformats.org/presentationml/2006/main">
   <p:cSld>
     <p:spTree>
@@ -6621,7 +7808,7 @@
 </p:sld>
 </file>
 
-<file path=ppt/slides/slide14.xml><?xml version="1.0" encoding="utf-8"?>
+<file path=ppt/slides/slide16.xml><?xml version="1.0" encoding="utf-8"?>
 <p:sld xmlns:a="http://schemas.openxmlformats.org/drawingml/2006/main" xmlns:r="http://schemas.openxmlformats.org/officeDocument/2006/relationships" xmlns:p="http://schemas.openxmlformats.org/presentationml/2006/main">
   <p:cSld>
     <p:spTree>
@@ -6660,11 +7847,219 @@
           </a:bodyPr>
           <a:lstStyle/>
           <a:p>
+            <a:pPr marL="0" indent="0" algn="ctr">
+              <a:buNone/>
+            </a:pPr>
             <a:r>
               <a:rPr lang="pt-BR" sz="1800" dirty="0" smtClean="0"/>
-              <a:t>referências</a:t>
-            </a:r>
-            <a:endParaRPr lang="pt-BR" sz="1800" dirty="0"/>
+              <a:t>Referências</a:t>
+            </a:r>
+          </a:p>
+          <a:p>
+            <a:pPr marL="0" indent="0" algn="ctr">
+              <a:buNone/>
+            </a:pPr>
+            <a:endParaRPr lang="pt-BR" sz="1800" dirty="0" smtClean="0"/>
+          </a:p>
+          <a:p>
+            <a:pPr marL="0" indent="0" algn="ctr">
+              <a:buNone/>
+            </a:pPr>
+            <a:r>
+              <a:rPr lang="pt-BR" sz="1800" dirty="0" smtClean="0"/>
+              <a:t>Cadastro Nacional de Bicicletas Roubadas - Site criado em 2004 por ciclistas </a:t>
+            </a:r>
+            <a:r>
+              <a:rPr lang="pt-BR" sz="1400" dirty="0" smtClean="0">
+                <a:hlinkClick r:id="rId3"/>
+              </a:rPr>
+              <a:t>http</a:t>
+            </a:r>
+            <a:r>
+              <a:rPr lang="pt-BR" sz="1400" dirty="0">
+                <a:hlinkClick r:id="rId3"/>
+              </a:rPr>
+              <a:t>://</a:t>
+            </a:r>
+            <a:r>
+              <a:rPr lang="pt-BR" sz="1400" dirty="0" smtClean="0">
+                <a:hlinkClick r:id="rId3"/>
+              </a:rPr>
+              <a:t>www.bicicletasroubadas.com.br</a:t>
+            </a:r>
+            <a:endParaRPr lang="pt-BR" sz="1400" dirty="0"/>
+          </a:p>
+          <a:p>
+            <a:pPr marL="457200" lvl="1" indent="0" algn="ctr">
+              <a:buNone/>
+            </a:pPr>
+            <a:endParaRPr lang="pt-BR" sz="1400" dirty="0" smtClean="0"/>
+          </a:p>
+          <a:p>
+            <a:pPr marL="0" indent="0" algn="ctr">
+              <a:buNone/>
+            </a:pPr>
+            <a:r>
+              <a:rPr lang="pt-BR" sz="1800" dirty="0" smtClean="0"/>
+              <a:t>Associação Brasileira do Setor de Bicicletas</a:t>
+            </a:r>
+            <a:br>
+              <a:rPr lang="pt-BR" sz="1800" dirty="0" smtClean="0"/>
+            </a:br>
+            <a:r>
+              <a:rPr lang="pt-BR" sz="1400" dirty="0" smtClean="0">
+                <a:hlinkClick r:id="rId4"/>
+              </a:rPr>
+              <a:t>http</a:t>
+            </a:r>
+            <a:r>
+              <a:rPr lang="pt-BR" sz="1400" dirty="0">
+                <a:hlinkClick r:id="rId4"/>
+              </a:rPr>
+              <a:t>://</a:t>
+            </a:r>
+            <a:r>
+              <a:rPr lang="pt-BR" sz="1400" dirty="0" smtClean="0">
+                <a:hlinkClick r:id="rId4"/>
+              </a:rPr>
+              <a:t>www.aliancabike.org.br</a:t>
+            </a:r>
+            <a:endParaRPr lang="pt-BR" sz="1400" dirty="0" smtClean="0"/>
+          </a:p>
+          <a:p>
+            <a:pPr marL="457200" lvl="1" indent="0" algn="ctr">
+              <a:buNone/>
+            </a:pPr>
+            <a:endParaRPr lang="pt-BR" sz="1400" dirty="0" smtClean="0"/>
+          </a:p>
+          <a:p>
+            <a:pPr marL="0" lvl="1" indent="0" algn="ctr">
+              <a:spcBef>
+                <a:spcPts val="1000"/>
+              </a:spcBef>
+              <a:buNone/>
+            </a:pPr>
+            <a:r>
+              <a:rPr lang="pt-BR" sz="1800" dirty="0" smtClean="0"/>
+              <a:t>Portal </a:t>
+            </a:r>
+            <a:r>
+              <a:rPr lang="pt-BR" sz="1800" dirty="0"/>
+              <a:t>Globo – </a:t>
+            </a:r>
+            <a:r>
+              <a:rPr lang="pt-BR" sz="1800" dirty="0" smtClean="0"/>
+              <a:t>G1</a:t>
+            </a:r>
+            <a:br>
+              <a:rPr lang="pt-BR" sz="1800" dirty="0" smtClean="0"/>
+            </a:br>
+            <a:r>
+              <a:rPr lang="pt-BR" sz="1400" dirty="0" smtClean="0">
+                <a:hlinkClick r:id="rId5"/>
+              </a:rPr>
+              <a:t>https</a:t>
+            </a:r>
+            <a:r>
+              <a:rPr lang="pt-BR" sz="1400" dirty="0">
+                <a:hlinkClick r:id="rId5"/>
+              </a:rPr>
+              <a:t>://</a:t>
+            </a:r>
+            <a:r>
+              <a:rPr lang="pt-BR" sz="1400" dirty="0" smtClean="0">
+                <a:hlinkClick r:id="rId5"/>
+              </a:rPr>
+              <a:t>g1.globo.com</a:t>
+            </a:r>
+            <a:endParaRPr lang="pt-BR" sz="1400" dirty="0"/>
+          </a:p>
+          <a:p>
+            <a:pPr marL="457200" lvl="1" indent="0" algn="ctr">
+              <a:buNone/>
+            </a:pPr>
+            <a:endParaRPr lang="pt-BR" sz="1400" dirty="0" smtClean="0"/>
+          </a:p>
+          <a:p>
+            <a:pPr marL="0" lvl="1" indent="0" algn="ctr">
+              <a:spcBef>
+                <a:spcPts val="1000"/>
+              </a:spcBef>
+              <a:buNone/>
+            </a:pPr>
+            <a:r>
+              <a:rPr lang="pt-BR" sz="1800" dirty="0" err="1" smtClean="0"/>
+              <a:t>Shimano</a:t>
+            </a:r>
+            <a:r>
+              <a:rPr lang="pt-BR" sz="1800" dirty="0" smtClean="0"/>
+              <a:t> </a:t>
+            </a:r>
+            <a:r>
+              <a:rPr lang="pt-BR" sz="1800" dirty="0" err="1" smtClean="0"/>
+              <a:t>Fest</a:t>
+            </a:r>
+            <a:r>
+              <a:rPr lang="pt-BR" sz="1800" dirty="0" smtClean="0"/>
+              <a:t> 2019</a:t>
+            </a:r>
+            <a:br>
+              <a:rPr lang="pt-BR" sz="1800" dirty="0" smtClean="0"/>
+            </a:br>
+            <a:r>
+              <a:rPr lang="pt-BR" sz="1400" dirty="0" smtClean="0">
+                <a:hlinkClick r:id="rId6"/>
+              </a:rPr>
+              <a:t>https://shimanofest.com.br</a:t>
+            </a:r>
+            <a:endParaRPr lang="pt-BR" sz="1400" dirty="0" smtClean="0"/>
+          </a:p>
+          <a:p>
+            <a:pPr marL="457200" lvl="1" indent="0" algn="ctr">
+              <a:buNone/>
+            </a:pPr>
+            <a:endParaRPr lang="pt-BR" sz="1400" dirty="0"/>
+          </a:p>
+          <a:p>
+            <a:pPr marL="0" lvl="1" indent="0" algn="ctr">
+              <a:spcBef>
+                <a:spcPts val="1000"/>
+              </a:spcBef>
+              <a:buNone/>
+            </a:pPr>
+            <a:r>
+              <a:rPr lang="pt-BR" sz="1800" dirty="0" smtClean="0"/>
+              <a:t>Associação Brasileira dos Fabricantes de Motocicletas,</a:t>
+            </a:r>
+            <a:br>
+              <a:rPr lang="pt-BR" sz="1800" dirty="0" smtClean="0"/>
+            </a:br>
+            <a:r>
+              <a:rPr lang="pt-BR" sz="1800" dirty="0" smtClean="0"/>
+              <a:t>Ciclomotores, Motonetas, Bicicletas e Similares</a:t>
+            </a:r>
+            <a:br>
+              <a:rPr lang="pt-BR" sz="1800" dirty="0" smtClean="0"/>
+            </a:br>
+            <a:r>
+              <a:rPr lang="pt-BR" sz="1400" dirty="0" smtClean="0">
+                <a:hlinkClick r:id="rId7"/>
+              </a:rPr>
+              <a:t>https://abraciclo.com.br</a:t>
+            </a:r>
+            <a:endParaRPr lang="pt-BR" sz="1400" dirty="0" smtClean="0"/>
+          </a:p>
+          <a:p>
+            <a:pPr marL="457200" lvl="1" indent="0">
+              <a:buNone/>
+            </a:pPr>
+            <a:endParaRPr lang="pt-BR" sz="1400" dirty="0" smtClean="0"/>
+          </a:p>
+          <a:p>
+            <a:pPr marL="457200" lvl="1" indent="0">
+              <a:buNone/>
+            </a:pPr>
+            <a:endParaRPr lang="pt-BR" sz="1400" dirty="0"/>
           </a:p>
         </p:txBody>
       </p:sp>
@@ -7956,11 +9351,7 @@
             </a:pPr>
             <a:r>
               <a:rPr lang="pt-BR" dirty="0" smtClean="0"/>
-              <a:t>Segurança </a:t>
-            </a:r>
-            <a:r>
-              <a:rPr lang="pt-BR" dirty="0" smtClean="0"/>
-              <a:t>em pleno crescimento</a:t>
+              <a:t>Segurança em pleno crescimento</a:t>
             </a:r>
           </a:p>
           <a:p>
@@ -8489,11 +9880,7 @@
           <a:p>
             <a:r>
               <a:rPr lang="pt-BR" dirty="0" smtClean="0"/>
-              <a:t>Roubos e furtos: BIKE </a:t>
-            </a:r>
-            <a:r>
-              <a:rPr lang="pt-BR" dirty="0" smtClean="0"/>
-              <a:t>X MOTO</a:t>
+              <a:t>Roubos e furtos: BIKE X MOTO</a:t>
             </a:r>
             <a:endParaRPr lang="pt-BR" dirty="0"/>
           </a:p>
@@ -8690,13 +10077,8 @@
             </a:pPr>
             <a:r>
               <a:rPr lang="pt-BR" dirty="0" smtClean="0"/>
-              <a:t>Atingir </a:t>
-            </a:r>
-            <a:r>
-              <a:rPr lang="pt-BR" dirty="0" smtClean="0"/>
-              <a:t>mercado inexplorado</a:t>
-            </a:r>
-            <a:endParaRPr lang="pt-BR" dirty="0" smtClean="0"/>
+              <a:t>Atingir mercado inexplorado</a:t>
+            </a:r>
           </a:p>
           <a:p>
             <a:pPr lvl="2">
@@ -8714,21 +10096,8 @@
             </a:pPr>
             <a:r>
               <a:rPr lang="pt-BR" dirty="0" smtClean="0"/>
-              <a:t>Sanar </a:t>
-            </a:r>
-            <a:r>
-              <a:rPr lang="pt-BR" dirty="0" smtClean="0"/>
-              <a:t>carência </a:t>
-            </a:r>
-            <a:r>
-              <a:rPr lang="pt-BR" dirty="0" smtClean="0"/>
-              <a:t>de </a:t>
-            </a:r>
-            <a:r>
-              <a:rPr lang="pt-BR" dirty="0" smtClean="0"/>
-              <a:t>serviços</a:t>
-            </a:r>
-            <a:endParaRPr lang="pt-BR" dirty="0" smtClean="0"/>
+              <a:t>Sanar carência de serviços</a:t>
+            </a:r>
           </a:p>
           <a:p>
             <a:pPr lvl="2">
@@ -8746,15 +10115,7 @@
             </a:pPr>
             <a:r>
               <a:rPr lang="pt-BR" dirty="0" smtClean="0"/>
-              <a:t>Ser </a:t>
-            </a:r>
-            <a:r>
-              <a:rPr lang="pt-BR" dirty="0" smtClean="0"/>
-              <a:t>pioneiro </a:t>
-            </a:r>
-            <a:r>
-              <a:rPr lang="pt-BR" dirty="0" smtClean="0"/>
-              <a:t>no Brasil</a:t>
+              <a:t>Ser pioneiro no Brasil</a:t>
             </a:r>
           </a:p>
           <a:p>
@@ -8773,11 +10134,7 @@
             </a:pPr>
             <a:r>
               <a:rPr lang="pt-BR" dirty="0" smtClean="0"/>
-              <a:t>Ampliar </a:t>
-            </a:r>
-            <a:r>
-              <a:rPr lang="pt-BR" dirty="0" smtClean="0"/>
-              <a:t>abrangência </a:t>
+              <a:t>Ampliar abrangência </a:t>
             </a:r>
             <a:r>
               <a:rPr lang="pt-BR" dirty="0" err="1" smtClean="0"/>
@@ -9020,32 +10377,6 @@
             <a:pPr marL="0" indent="0">
               <a:buNone/>
             </a:pPr>
-            <a:r>
-              <a:rPr lang="pt-BR" dirty="0" smtClean="0"/>
-              <a:t>Levantar parceiros</a:t>
-            </a:r>
-          </a:p>
-          <a:p>
-            <a:pPr marL="0" indent="0">
-              <a:buNone/>
-            </a:pPr>
-            <a:r>
-              <a:rPr lang="pt-BR" dirty="0" smtClean="0"/>
-              <a:t>	Velo </a:t>
-            </a:r>
-          </a:p>
-          <a:p>
-            <a:pPr marL="0" indent="0">
-              <a:buNone/>
-            </a:pPr>
-            <a:r>
-              <a:rPr lang="pt-BR" dirty="0"/>
-              <a:t>	</a:t>
-            </a:r>
-            <a:r>
-              <a:rPr lang="pt-BR" dirty="0" err="1" smtClean="0"/>
-              <a:t>Kakau</a:t>
-            </a:r>
             <a:endParaRPr lang="pt-BR" dirty="0" smtClean="0"/>
           </a:p>
         </p:txBody>
@@ -9085,285 +10416,78 @@
       </p:sp>
       <p:grpSp>
         <p:nvGrpSpPr>
-          <p:cNvPr id="16" name="Grupo 15"/>
+          <p:cNvPr id="14" name="Grupo 13"/>
           <p:cNvGrpSpPr/>
           <p:nvPr/>
         </p:nvGrpSpPr>
         <p:grpSpPr>
           <a:xfrm>
-            <a:off x="8799443" y="1825625"/>
-            <a:ext cx="2554357" cy="2557528"/>
-            <a:chOff x="8799443" y="1690688"/>
-            <a:chExt cx="2554357" cy="2557528"/>
+            <a:off x="345542" y="2961658"/>
+            <a:ext cx="11500916" cy="3030176"/>
+            <a:chOff x="226635" y="2961658"/>
+            <a:chExt cx="11500916" cy="3030176"/>
           </a:xfrm>
         </p:grpSpPr>
-        <p:grpSp>
-          <p:nvGrpSpPr>
-            <p:cNvPr id="9" name="Grupo 8"/>
-            <p:cNvGrpSpPr/>
+        <p:pic>
+          <p:nvPicPr>
+            <p:cNvPr id="5" name="Imagem 4"/>
+            <p:cNvPicPr>
+              <a:picLocks noChangeAspect="1"/>
+            </p:cNvPicPr>
             <p:nvPr/>
-          </p:nvGrpSpPr>
-          <p:grpSpPr>
-            <a:xfrm>
-              <a:off x="8799443" y="1690688"/>
-              <a:ext cx="2554357" cy="698914"/>
-              <a:chOff x="7573617" y="1825625"/>
-              <a:chExt cx="2554357" cy="698914"/>
-            </a:xfrm>
-          </p:grpSpPr>
-          <p:sp>
-            <p:nvSpPr>
-              <p:cNvPr id="7" name="Retângulo 6"/>
-              <p:cNvSpPr/>
-              <p:nvPr/>
-            </p:nvSpPr>
-            <p:spPr>
-              <a:xfrm>
-                <a:off x="7573617" y="1825625"/>
-                <a:ext cx="2554357" cy="698914"/>
-              </a:xfrm>
-              <a:prstGeom prst="rect">
-                <a:avLst/>
-              </a:prstGeom>
-              <a:solidFill>
-                <a:schemeClr val="bg1"/>
-              </a:solidFill>
-            </p:spPr>
-            <p:style>
-              <a:lnRef idx="2">
-                <a:schemeClr val="accent1">
-                  <a:shade val="50000"/>
-                </a:schemeClr>
-              </a:lnRef>
-              <a:fillRef idx="1">
-                <a:schemeClr val="accent1"/>
-              </a:fillRef>
-              <a:effectRef idx="0">
-                <a:schemeClr val="accent1"/>
-              </a:effectRef>
-              <a:fontRef idx="minor">
-                <a:schemeClr val="lt1"/>
-              </a:fontRef>
-            </p:style>
-            <p:txBody>
-              <a:bodyPr rtlCol="0" anchor="ctr"/>
-              <a:lstStyle/>
-              <a:p>
-                <a:pPr algn="ctr"/>
-                <a:endParaRPr lang="pt-BR"/>
-              </a:p>
-            </p:txBody>
-          </p:sp>
-          <p:pic>
-            <p:nvPicPr>
-              <p:cNvPr id="6" name="Picture 2" descr="https://veloseguro.com/wp-content/uploads/2018/12/logo-velo-seguro-nova.png"/>
-              <p:cNvPicPr>
-                <a:picLocks noChangeAspect="1" noChangeArrowheads="1"/>
-              </p:cNvPicPr>
-              <p:nvPr/>
-            </p:nvPicPr>
-            <p:blipFill>
-              <a:blip r:embed="rId3">
-                <a:extLst>
-                  <a:ext uri="{28A0092B-C50C-407E-A947-70E740481C1C}">
-                    <a14:useLocalDpi xmlns:a14="http://schemas.microsoft.com/office/drawing/2010/main" val="0"/>
-                  </a:ext>
-                </a:extLst>
-              </a:blip>
-              <a:srcRect/>
-              <a:stretch>
-                <a:fillRect/>
-              </a:stretch>
-            </p:blipFill>
-            <p:spPr bwMode="auto">
-              <a:xfrm>
-                <a:off x="7898295" y="1917906"/>
-                <a:ext cx="1905000" cy="514351"/>
-              </a:xfrm>
-              <a:prstGeom prst="rect">
-                <a:avLst/>
-              </a:prstGeom>
-              <a:noFill/>
+          </p:nvPicPr>
+          <p:blipFill>
+            <a:blip r:embed="rId3">
               <a:extLst>
-                <a:ext uri="{909E8E84-426E-40DD-AFC4-6F175D3DCCD1}">
-                  <a14:hiddenFill xmlns:a14="http://schemas.microsoft.com/office/drawing/2010/main">
-                    <a:solidFill>
-                      <a:srgbClr val="FFFFFF"/>
-                    </a:solidFill>
-                  </a14:hiddenFill>
+                <a:ext uri="{28A0092B-C50C-407E-A947-70E740481C1C}">
+                  <a14:useLocalDpi xmlns:a14="http://schemas.microsoft.com/office/drawing/2010/main" val="0"/>
                 </a:ext>
               </a:extLst>
-            </p:spPr>
-          </p:pic>
-        </p:grpSp>
-        <p:grpSp>
-          <p:nvGrpSpPr>
-            <p:cNvPr id="11" name="Grupo 10"/>
-            <p:cNvGrpSpPr/>
-            <p:nvPr/>
-          </p:nvGrpSpPr>
-          <p:grpSpPr>
-            <a:xfrm>
-              <a:off x="8799443" y="3179971"/>
-              <a:ext cx="2554357" cy="698914"/>
-              <a:chOff x="7667486" y="4598297"/>
-              <a:chExt cx="2554357" cy="698914"/>
-            </a:xfrm>
-          </p:grpSpPr>
-          <p:sp>
-            <p:nvSpPr>
-              <p:cNvPr id="10" name="Retângulo 9"/>
-              <p:cNvSpPr/>
-              <p:nvPr/>
-            </p:nvSpPr>
-            <p:spPr>
-              <a:xfrm>
-                <a:off x="7667486" y="4598297"/>
-                <a:ext cx="2554357" cy="698914"/>
-              </a:xfrm>
-              <a:prstGeom prst="rect">
-                <a:avLst/>
-              </a:prstGeom>
-            </p:spPr>
-            <p:style>
-              <a:lnRef idx="2">
-                <a:schemeClr val="accent1">
-                  <a:shade val="50000"/>
-                </a:schemeClr>
-              </a:lnRef>
-              <a:fillRef idx="1">
-                <a:schemeClr val="accent1"/>
-              </a:fillRef>
-              <a:effectRef idx="0">
-                <a:schemeClr val="accent1"/>
-              </a:effectRef>
-              <a:fontRef idx="minor">
-                <a:schemeClr val="lt1"/>
-              </a:fontRef>
-            </p:style>
-            <p:txBody>
-              <a:bodyPr rtlCol="0" anchor="ctr"/>
-              <a:lstStyle/>
-              <a:p>
-                <a:pPr algn="ctr"/>
-                <a:endParaRPr lang="pt-BR"/>
-              </a:p>
-            </p:txBody>
-          </p:sp>
-          <p:pic>
-            <p:nvPicPr>
-              <p:cNvPr id="1028" name="Picture 4" descr="https://www.kakau.co/assets/logo_white@2x-82cf6f60481ee34d7fe7ddd430ddc0227d776634293e72bdca14d578618f5f79.png"/>
-              <p:cNvPicPr>
-                <a:picLocks noChangeAspect="1" noChangeArrowheads="1"/>
-              </p:cNvPicPr>
-              <p:nvPr/>
-            </p:nvPicPr>
-            <p:blipFill>
-              <a:blip r:embed="rId4">
-                <a:extLst>
-                  <a:ext uri="{28A0092B-C50C-407E-A947-70E740481C1C}">
-                    <a14:useLocalDpi xmlns:a14="http://schemas.microsoft.com/office/drawing/2010/main" val="0"/>
-                  </a:ext>
-                </a:extLst>
-              </a:blip>
-              <a:srcRect/>
-              <a:stretch>
-                <a:fillRect/>
-              </a:stretch>
-            </p:blipFill>
-            <p:spPr bwMode="auto">
-              <a:xfrm>
-                <a:off x="7824786" y="4708644"/>
-                <a:ext cx="2239756" cy="478219"/>
-              </a:xfrm>
-              <a:prstGeom prst="rect">
-                <a:avLst/>
-              </a:prstGeom>
-              <a:noFill/>
-              <a:extLst>
-                <a:ext uri="{909E8E84-426E-40DD-AFC4-6F175D3DCCD1}">
-                  <a14:hiddenFill xmlns:a14="http://schemas.microsoft.com/office/drawing/2010/main">
-                    <a:solidFill>
-                      <a:srgbClr val="FFFFFF"/>
-                    </a:solidFill>
-                  </a14:hiddenFill>
-                </a:ext>
-              </a:extLst>
-            </p:spPr>
-          </p:pic>
-        </p:grpSp>
-        <p:sp>
-          <p:nvSpPr>
-            <p:cNvPr id="15" name="CaixaDeTexto 14"/>
-            <p:cNvSpPr txBox="1"/>
-            <p:nvPr/>
-          </p:nvSpPr>
+            </a:blip>
+            <a:stretch>
+              <a:fillRect/>
+            </a:stretch>
+          </p:blipFill>
           <p:spPr>
             <a:xfrm>
-              <a:off x="9040920" y="2385875"/>
-              <a:ext cx="2071401" cy="369332"/>
+              <a:off x="226635" y="2961659"/>
+              <a:ext cx="5622022" cy="3030175"/>
             </a:xfrm>
             <a:prstGeom prst="rect">
               <a:avLst/>
             </a:prstGeom>
-            <a:noFill/>
           </p:spPr>
-          <p:txBody>
-            <a:bodyPr wrap="none" rtlCol="0">
-              <a:spAutoFit/>
-            </a:bodyPr>
-            <a:lstStyle/>
-            <a:p>
-              <a:pPr algn="ctr"/>
-              <a:r>
-                <a:rPr lang="pt-BR" dirty="0" smtClean="0">
-                  <a:latin typeface="Pathway Gothic One" panose="02000506050000020004" pitchFamily="2" charset="0"/>
-                  <a:hlinkClick r:id="rId5"/>
-                </a:rPr>
-                <a:t>HTTPS://VELOSEGURO.COM/</a:t>
-              </a:r>
-              <a:endParaRPr lang="pt-BR" dirty="0">
-                <a:latin typeface="Pathway Gothic One" panose="02000506050000020004" pitchFamily="2" charset="0"/>
-              </a:endParaRPr>
-            </a:p>
-          </p:txBody>
-        </p:sp>
-        <p:sp>
-          <p:nvSpPr>
-            <p:cNvPr id="18" name="CaixaDeTexto 17"/>
-            <p:cNvSpPr txBox="1"/>
+        </p:pic>
+        <p:pic>
+          <p:nvPicPr>
+            <p:cNvPr id="19" name="Imagem 18"/>
+            <p:cNvPicPr>
+              <a:picLocks noChangeAspect="1"/>
+            </p:cNvPicPr>
             <p:nvPr/>
-          </p:nvSpPr>
+          </p:nvPicPr>
+          <p:blipFill>
+            <a:blip r:embed="rId4">
+              <a:extLst>
+                <a:ext uri="{28A0092B-C50C-407E-A947-70E740481C1C}">
+                  <a14:useLocalDpi xmlns:a14="http://schemas.microsoft.com/office/drawing/2010/main" val="0"/>
+                </a:ext>
+              </a:extLst>
+            </a:blip>
+            <a:stretch>
+              <a:fillRect/>
+            </a:stretch>
+          </p:blipFill>
           <p:spPr>
             <a:xfrm>
-              <a:off x="9102635" y="3878884"/>
-              <a:ext cx="1947969" cy="369332"/>
+              <a:off x="6096000" y="2961658"/>
+              <a:ext cx="5631551" cy="3030175"/>
             </a:xfrm>
             <a:prstGeom prst="rect">
               <a:avLst/>
             </a:prstGeom>
-            <a:noFill/>
           </p:spPr>
-          <p:txBody>
-            <a:bodyPr wrap="none" rtlCol="0">
-              <a:spAutoFit/>
-            </a:bodyPr>
-            <a:lstStyle/>
-            <a:p>
-              <a:pPr algn="ctr"/>
-              <a:r>
-                <a:rPr lang="pt-BR" dirty="0" smtClean="0">
-                  <a:latin typeface="Pathway Gothic One" panose="02000506050000020004" pitchFamily="2" charset="0"/>
-                  <a:hlinkClick r:id="rId6"/>
-                </a:rPr>
-                <a:t>HTTPS://WWW.KAKAU.CO/</a:t>
-              </a:r>
-              <a:endParaRPr lang="pt-BR" dirty="0">
-                <a:latin typeface="Pathway Gothic One" panose="02000506050000020004" pitchFamily="2" charset="0"/>
-              </a:endParaRPr>
-            </a:p>
-          </p:txBody>
-        </p:sp>
+        </p:pic>
       </p:grpSp>
     </p:spTree>
     <p:extLst>
@@ -9409,100 +10533,7 @@
                                           </p:stCondLst>
                                         </p:cTn>
                                         <p:tgtEl>
-                                          <p:spTgt spid="3">
-                                            <p:txEl>
-                                              <p:pRg st="3" end="3"/>
-                                            </p:txEl>
-                                          </p:spTgt>
-                                        </p:tgtEl>
-                                        <p:attrNameLst>
-                                          <p:attrName>style.visibility</p:attrName>
-                                        </p:attrNameLst>
-                                      </p:cBhvr>
-                                      <p:to>
-                                        <p:strVal val="visible"/>
-                                      </p:to>
-                                    </p:set>
-                                  </p:childTnLst>
-                                </p:cTn>
-                              </p:par>
-                              <p:par>
-                                <p:cTn id="7" presetID="1" presetClass="entr" presetSubtype="0" fill="hold" nodeType="withEffect">
-                                  <p:stCondLst>
-                                    <p:cond delay="0"/>
-                                  </p:stCondLst>
-                                  <p:childTnLst>
-                                    <p:set>
-                                      <p:cBhvr>
-                                        <p:cTn id="8" dur="1" fill="hold">
-                                          <p:stCondLst>
-                                            <p:cond delay="0"/>
-                                          </p:stCondLst>
-                                        </p:cTn>
-                                        <p:tgtEl>
-                                          <p:spTgt spid="16"/>
-                                        </p:tgtEl>
-                                        <p:attrNameLst>
-                                          <p:attrName>style.visibility</p:attrName>
-                                        </p:attrNameLst>
-                                      </p:cBhvr>
-                                      <p:to>
-                                        <p:strVal val="visible"/>
-                                      </p:to>
-                                    </p:set>
-                                  </p:childTnLst>
-                                </p:cTn>
-                              </p:par>
-                              <p:par>
-                                <p:cTn id="9" presetID="1" presetClass="entr" presetSubtype="0" fill="hold" nodeType="withEffect">
-                                  <p:stCondLst>
-                                    <p:cond delay="0"/>
-                                  </p:stCondLst>
-                                  <p:childTnLst>
-                                    <p:set>
-                                      <p:cBhvr>
-                                        <p:cTn id="10" dur="1" fill="hold">
-                                          <p:stCondLst>
-                                            <p:cond delay="0"/>
-                                          </p:stCondLst>
-                                        </p:cTn>
-                                        <p:tgtEl>
-                                          <p:spTgt spid="3">
-                                            <p:txEl>
-                                              <p:pRg st="4" end="4"/>
-                                            </p:txEl>
-                                          </p:spTgt>
-                                        </p:tgtEl>
-                                        <p:attrNameLst>
-                                          <p:attrName>style.visibility</p:attrName>
-                                        </p:attrNameLst>
-                                      </p:cBhvr>
-                                      <p:to>
-                                        <p:strVal val="visible"/>
-                                      </p:to>
-                                    </p:set>
-                                  </p:childTnLst>
-                                </p:cTn>
-                              </p:par>
-                              <p:par>
-                                <p:cTn id="11" presetID="1" presetClass="entr" presetSubtype="0" fill="hold" nodeType="withEffect">
-                                  <p:stCondLst>
-                                    <p:cond delay="0"/>
-                                  </p:stCondLst>
-                                  <p:childTnLst>
-                                    <p:set>
-                                      <p:cBhvr>
-                                        <p:cTn id="12" dur="1" fill="hold">
-                                          <p:stCondLst>
-                                            <p:cond delay="0"/>
-                                          </p:stCondLst>
-                                        </p:cTn>
-                                        <p:tgtEl>
-                                          <p:spTgt spid="3">
-                                            <p:txEl>
-                                              <p:pRg st="5" end="5"/>
-                                            </p:txEl>
-                                          </p:spTgt>
+                                          <p:spTgt spid="14"/>
                                         </p:tgtEl>
                                         <p:attrNameLst>
                                           <p:attrName>style.visibility</p:attrName>
@@ -9563,6 +10594,66 @@
           <a:chExt cx="0" cy="0"/>
         </a:xfrm>
       </p:grpSpPr>
+      <p:pic>
+        <p:nvPicPr>
+          <p:cNvPr id="11" name="Imagem 10"/>
+          <p:cNvPicPr>
+            <a:picLocks noChangeAspect="1"/>
+          </p:cNvPicPr>
+          <p:nvPr/>
+        </p:nvPicPr>
+        <p:blipFill>
+          <a:blip r:embed="rId3">
+            <a:extLst>
+              <a:ext uri="{28A0092B-C50C-407E-A947-70E740481C1C}">
+                <a14:useLocalDpi xmlns:a14="http://schemas.microsoft.com/office/drawing/2010/main" val="0"/>
+              </a:ext>
+            </a:extLst>
+          </a:blip>
+          <a:stretch>
+            <a:fillRect/>
+          </a:stretch>
+        </p:blipFill>
+        <p:spPr>
+          <a:xfrm>
+            <a:off x="6157734" y="2961658"/>
+            <a:ext cx="5688724" cy="3030175"/>
+          </a:xfrm>
+          <a:prstGeom prst="rect">
+            <a:avLst/>
+          </a:prstGeom>
+        </p:spPr>
+      </p:pic>
+      <p:pic>
+        <p:nvPicPr>
+          <p:cNvPr id="12" name="Imagem 11"/>
+          <p:cNvPicPr>
+            <a:picLocks noChangeAspect="1"/>
+          </p:cNvPicPr>
+          <p:nvPr/>
+        </p:nvPicPr>
+        <p:blipFill>
+          <a:blip r:embed="rId4">
+            <a:extLst>
+              <a:ext uri="{28A0092B-C50C-407E-A947-70E740481C1C}">
+                <a14:useLocalDpi xmlns:a14="http://schemas.microsoft.com/office/drawing/2010/main" val="0"/>
+              </a:ext>
+            </a:extLst>
+          </a:blip>
+          <a:stretch>
+            <a:fillRect/>
+          </a:stretch>
+        </p:blipFill>
+        <p:spPr>
+          <a:xfrm>
+            <a:off x="345542" y="2961658"/>
+            <a:ext cx="5679196" cy="3020646"/>
+          </a:xfrm>
+          <a:prstGeom prst="rect">
+            <a:avLst/>
+          </a:prstGeom>
+        </p:spPr>
+      </p:pic>
       <p:sp>
         <p:nvSpPr>
           <p:cNvPr id="2" name="Título 1"/>
@@ -9603,9 +10694,31 @@
         <p:spPr/>
         <p:txBody>
           <a:bodyPr>
-            <a:normAutofit fontScale="92500" lnSpcReduction="20000"/>
+            <a:normAutofit/>
           </a:bodyPr>
           <a:lstStyle/>
+          <a:p>
+            <a:pPr marL="0" indent="0">
+              <a:buNone/>
+            </a:pPr>
+            <a:r>
+              <a:rPr lang="pt-BR" dirty="0" smtClean="0"/>
+              <a:t>Validar com cliente</a:t>
+            </a:r>
+          </a:p>
+          <a:p>
+            <a:pPr marL="0" indent="0">
+              <a:buNone/>
+            </a:pPr>
+            <a:r>
+              <a:rPr lang="pt-BR" dirty="0"/>
+              <a:t>	</a:t>
+            </a:r>
+            <a:r>
+              <a:rPr lang="pt-BR" dirty="0" smtClean="0"/>
+              <a:t>Pesquisa quantitativa</a:t>
+            </a:r>
+          </a:p>
           <a:p>
             <a:pPr marL="0" indent="0">
               <a:buNone/>
@@ -9616,89 +10729,7 @@
             <a:pPr marL="0" indent="0">
               <a:buNone/>
             </a:pPr>
-            <a:r>
-              <a:rPr lang="pt-BR" sz="3600" dirty="0" smtClean="0"/>
-              <a:t>Campanha </a:t>
-            </a:r>
-            <a:r>
-              <a:rPr lang="pt-BR" sz="3600" dirty="0" smtClean="0"/>
-              <a:t>de </a:t>
-            </a:r>
-            <a:r>
-              <a:rPr lang="pt-BR" sz="3600" dirty="0" smtClean="0"/>
-              <a:t>marketing</a:t>
-            </a:r>
-          </a:p>
-          <a:p>
-            <a:pPr marL="0" indent="0">
-              <a:buNone/>
-            </a:pPr>
-            <a:endParaRPr lang="pt-BR" sz="3600" dirty="0" smtClean="0"/>
-          </a:p>
-          <a:p>
-            <a:pPr marL="0" indent="0">
-              <a:buNone/>
-            </a:pPr>
-            <a:endParaRPr lang="pt-BR" sz="3600" dirty="0"/>
-          </a:p>
-          <a:p>
-            <a:pPr marL="0" indent="0">
-              <a:buNone/>
-            </a:pPr>
-            <a:r>
-              <a:rPr lang="pt-BR" sz="3600" dirty="0" smtClean="0"/>
-              <a:t>Parte técnica</a:t>
-            </a:r>
-          </a:p>
-          <a:p>
-            <a:pPr marL="0" indent="0">
-              <a:buNone/>
-            </a:pPr>
-            <a:endParaRPr lang="pt-BR" sz="3600" dirty="0" smtClean="0"/>
-          </a:p>
-          <a:p>
-            <a:pPr marL="0" indent="0">
-              <a:buNone/>
-            </a:pPr>
-            <a:r>
-              <a:rPr lang="pt-BR" sz="3600" dirty="0" smtClean="0"/>
-              <a:t>	</a:t>
-            </a:r>
-            <a:r>
-              <a:rPr lang="pt-BR" sz="3600" dirty="0" err="1" smtClean="0"/>
-              <a:t>Re-engenharia</a:t>
-            </a:r>
-            <a:r>
-              <a:rPr lang="pt-BR" sz="3600" dirty="0" smtClean="0"/>
-              <a:t> do rastreador</a:t>
-            </a:r>
-          </a:p>
-          <a:p>
-            <a:pPr marL="0" indent="0">
-              <a:buNone/>
-            </a:pPr>
-            <a:endParaRPr lang="pt-BR" sz="3600" dirty="0" smtClean="0"/>
-          </a:p>
-          <a:p>
-            <a:pPr marL="0" indent="0">
-              <a:buNone/>
-            </a:pPr>
-            <a:r>
-              <a:rPr lang="pt-BR" sz="3600" dirty="0" smtClean="0"/>
-              <a:t>	Beta-</a:t>
-            </a:r>
-            <a:r>
-              <a:rPr lang="pt-BR" sz="3600" dirty="0" err="1" smtClean="0"/>
-              <a:t>Testing</a:t>
-            </a:r>
-            <a:r>
-              <a:rPr lang="pt-BR" sz="3600" dirty="0" smtClean="0"/>
-              <a:t> </a:t>
-            </a:r>
-            <a:r>
-              <a:rPr lang="pt-BR" sz="3600" dirty="0" smtClean="0"/>
-              <a:t>– Operações assistidas</a:t>
-            </a:r>
+            <a:endParaRPr lang="pt-BR" dirty="0" smtClean="0"/>
           </a:p>
         </p:txBody>
       </p:sp>
@@ -9738,7 +10769,7 @@
     </p:spTree>
     <p:extLst>
       <p:ext uri="{BB962C8B-B14F-4D97-AF65-F5344CB8AC3E}">
-        <p14:creationId xmlns:p14="http://schemas.microsoft.com/office/powerpoint/2010/main" val="632305710"/>
+        <p14:creationId xmlns:p14="http://schemas.microsoft.com/office/powerpoint/2010/main" val="3414912037"/>
       </p:ext>
     </p:extLst>
   </p:cSld>

</xml_diff>

<commit_message>
ops, mais algumas alteraçõeszinhas
</commit_message>
<xml_diff>
--- a/apresentacao/ituran-seguro-bike-final.pptx
+++ b/apresentacao/ituran-seguro-bike-final.pptx
@@ -935,7 +935,19 @@
             </a:r>
             <a:r>
               <a:rPr lang="pt-BR" baseline="0" dirty="0" smtClean="0"/>
-              <a:t> importante validar com a área técnica a possibilidade de redesenhar o rastreador para poder utilizar uma bicicleta como plataforma.</a:t>
+              <a:t> importante </a:t>
+            </a:r>
+            <a:r>
+              <a:rPr lang="pt-BR" baseline="0" smtClean="0"/>
+              <a:t>validar </a:t>
+            </a:r>
+            <a:r>
+              <a:rPr lang="pt-BR" baseline="0" smtClean="0"/>
+              <a:t>a </a:t>
+            </a:r>
+            <a:r>
+              <a:rPr lang="pt-BR" baseline="0" dirty="0" smtClean="0"/>
+              <a:t>possibilidade de redesenhar o rastreador para poder utilizar uma bicicleta como plataforma.</a:t>
             </a:r>
           </a:p>
           <a:p>
@@ -1053,10 +1065,12 @@
                 <a:ea typeface="+mn-ea"/>
                 <a:cs typeface="+mn-cs"/>
               </a:rPr>
-              <a:t>Slide </a:t>
-            </a:r>
-            <a:r>
-              <a:rPr lang="pt-BR" sz="1200" b="1" kern="1200" dirty="0" smtClean="0">
+              <a:t>Slide 11 - Quanto</a:t>
+            </a:r>
+          </a:p>
+          <a:p>
+            <a:r>
+              <a:rPr lang="pt-BR" sz="1200" kern="1200" dirty="0" smtClean="0">
                 <a:solidFill>
                   <a:schemeClr val="tx1"/>
                 </a:solidFill>
@@ -1065,10 +1079,10 @@
                 <a:ea typeface="+mn-ea"/>
                 <a:cs typeface="+mn-cs"/>
               </a:rPr>
-              <a:t>11 </a:t>
-            </a:r>
-            <a:r>
-              <a:rPr lang="pt-BR" sz="1200" b="1" kern="1200" dirty="0" smtClean="0">
+              <a:t>Ainda que tenhamos procurado diversos colegas de diversas áreas, os custos que conseguimos </a:t>
+            </a:r>
+            <a:r>
+              <a:rPr lang="pt-BR" sz="1200" kern="1200" dirty="0" err="1" smtClean="0">
                 <a:solidFill>
                   <a:schemeClr val="tx1"/>
                 </a:solidFill>
@@ -1077,10 +1091,8 @@
                 <a:ea typeface="+mn-ea"/>
                 <a:cs typeface="+mn-cs"/>
               </a:rPr>
-              <a:t>- Quanto</a:t>
-            </a:r>
-          </a:p>
-          <a:p>
+              <a:t>levantarsão</a:t>
+            </a:r>
             <a:r>
               <a:rPr lang="pt-BR" sz="1200" kern="1200" dirty="0" smtClean="0">
                 <a:solidFill>
@@ -1091,43 +1103,7 @@
                 <a:ea typeface="+mn-ea"/>
                 <a:cs typeface="+mn-cs"/>
               </a:rPr>
-              <a:t>Ainda que tenhamos procurado diversos colegas de diversas áreas, os custos que conseguimos </a:t>
-            </a:r>
-            <a:r>
-              <a:rPr lang="pt-BR" sz="1200" kern="1200" dirty="0" err="1" smtClean="0">
-                <a:solidFill>
-                  <a:schemeClr val="tx1"/>
-                </a:solidFill>
-                <a:effectLst/>
-                <a:latin typeface="+mn-lt"/>
-                <a:ea typeface="+mn-ea"/>
-                <a:cs typeface="+mn-cs"/>
-              </a:rPr>
-              <a:t>levantarsão</a:t>
-            </a:r>
-            <a:r>
-              <a:rPr lang="pt-BR" sz="1200" kern="1200" dirty="0" smtClean="0">
-                <a:solidFill>
-                  <a:schemeClr val="tx1"/>
-                </a:solidFill>
-                <a:effectLst/>
-                <a:latin typeface="+mn-lt"/>
-                <a:ea typeface="+mn-ea"/>
-                <a:cs typeface="+mn-cs"/>
-              </a:rPr>
-              <a:t> </a:t>
-            </a:r>
-            <a:r>
-              <a:rPr lang="pt-BR" sz="1200" kern="1200" dirty="0" smtClean="0">
-                <a:solidFill>
-                  <a:schemeClr val="tx1"/>
-                </a:solidFill>
-                <a:effectLst/>
-                <a:latin typeface="+mn-lt"/>
-                <a:ea typeface="+mn-ea"/>
-                <a:cs typeface="+mn-cs"/>
-              </a:rPr>
-              <a:t>apenas estimados. Estes custos envolvem o seguinte:</a:t>
+              <a:t> apenas estimados. Estes custos envolvem o seguinte:</a:t>
             </a:r>
           </a:p>
           <a:p>
@@ -1540,31 +1516,7 @@
                 <a:ea typeface="+mn-ea"/>
                 <a:cs typeface="+mn-cs"/>
               </a:rPr>
-              <a:t>Slide </a:t>
-            </a:r>
-            <a:r>
-              <a:rPr lang="pt-BR" sz="1200" b="1" kern="1200" dirty="0" smtClean="0">
-                <a:solidFill>
-                  <a:schemeClr val="tx1"/>
-                </a:solidFill>
-                <a:effectLst/>
-                <a:latin typeface="+mn-lt"/>
-                <a:ea typeface="+mn-ea"/>
-                <a:cs typeface="+mn-cs"/>
-              </a:rPr>
-              <a:t>13 </a:t>
-            </a:r>
-            <a:r>
-              <a:rPr lang="pt-BR" sz="1200" b="1" kern="1200" dirty="0" smtClean="0">
-                <a:solidFill>
-                  <a:schemeClr val="tx1"/>
-                </a:solidFill>
-                <a:effectLst/>
-                <a:latin typeface="+mn-lt"/>
-                <a:ea typeface="+mn-ea"/>
-                <a:cs typeface="+mn-cs"/>
-              </a:rPr>
-              <a:t>– </a:t>
+              <a:t>Slide 13 – </a:t>
             </a:r>
             <a:r>
               <a:rPr lang="pt-BR" sz="1200" b="1" kern="1200" dirty="0" err="1" smtClean="0">
@@ -1700,31 +1652,7 @@
                 <a:ea typeface="+mn-ea"/>
                 <a:cs typeface="+mn-cs"/>
               </a:rPr>
-              <a:t>Slide </a:t>
-            </a:r>
-            <a:r>
-              <a:rPr lang="pt-BR" sz="1200" b="1" kern="1200" dirty="0" smtClean="0">
-                <a:solidFill>
-                  <a:schemeClr val="tx1"/>
-                </a:solidFill>
-                <a:effectLst/>
-                <a:latin typeface="+mn-lt"/>
-                <a:ea typeface="+mn-ea"/>
-                <a:cs typeface="+mn-cs"/>
-              </a:rPr>
-              <a:t>14 </a:t>
-            </a:r>
-            <a:r>
-              <a:rPr lang="pt-BR" sz="1200" b="1" kern="1200" dirty="0" smtClean="0">
-                <a:solidFill>
-                  <a:schemeClr val="tx1"/>
-                </a:solidFill>
-                <a:effectLst/>
-                <a:latin typeface="+mn-lt"/>
-                <a:ea typeface="+mn-ea"/>
-                <a:cs typeface="+mn-cs"/>
-              </a:rPr>
-              <a:t>– Protótipo</a:t>
+              <a:t>Slide 14 – Protótipo</a:t>
             </a:r>
           </a:p>
           <a:p>
@@ -1898,31 +1826,7 @@
                 <a:ea typeface="+mn-ea"/>
                 <a:cs typeface="+mn-cs"/>
               </a:rPr>
-              <a:t>Slide </a:t>
-            </a:r>
-            <a:r>
-              <a:rPr lang="pt-BR" sz="1200" b="1" kern="1200" dirty="0" smtClean="0">
-                <a:solidFill>
-                  <a:schemeClr val="tx1"/>
-                </a:solidFill>
-                <a:effectLst/>
-                <a:latin typeface="+mn-lt"/>
-                <a:ea typeface="+mn-ea"/>
-                <a:cs typeface="+mn-cs"/>
-              </a:rPr>
-              <a:t>15 </a:t>
-            </a:r>
-            <a:r>
-              <a:rPr lang="pt-BR" sz="1200" b="1" kern="1200" dirty="0" smtClean="0">
-                <a:solidFill>
-                  <a:schemeClr val="tx1"/>
-                </a:solidFill>
-                <a:effectLst/>
-                <a:latin typeface="+mn-lt"/>
-                <a:ea typeface="+mn-ea"/>
-                <a:cs typeface="+mn-cs"/>
-              </a:rPr>
-              <a:t>– Referências / Bibliografia</a:t>
+              <a:t>Slide 15 – Referências / Bibliografia</a:t>
             </a:r>
           </a:p>
           <a:p>
@@ -2248,15 +2152,6 @@
               </a:rPr>
               <a:t>, </a:t>
             </a:r>
-            <a:endParaRPr lang="pt-BR" sz="1200" kern="1200" dirty="0" smtClean="0">
-              <a:solidFill>
-                <a:schemeClr val="tx1"/>
-              </a:solidFill>
-              <a:effectLst/>
-              <a:latin typeface="+mn-lt"/>
-              <a:ea typeface="+mn-ea"/>
-              <a:cs typeface="+mn-cs"/>
-            </a:endParaRPr>
           </a:p>
           <a:p>
             <a:pPr lvl="0"/>
@@ -2270,8 +2165,11 @@
                 <a:ea typeface="+mn-ea"/>
                 <a:cs typeface="+mn-cs"/>
               </a:rPr>
-              <a:t>no âmbito da produção que retomou seu crescimento em dois mil e </a:t>
-            </a:r>
+              <a:t>no âmbito da produção que retomou seu crescimento em dois mil e dezoito;</a:t>
+            </a:r>
+          </a:p>
+          <a:p>
+            <a:pPr lvl="0"/>
             <a:r>
               <a:rPr lang="pt-BR" sz="1200" kern="1200" dirty="0" smtClean="0">
                 <a:solidFill>
@@ -2282,7 +2180,7 @@
                 <a:ea typeface="+mn-ea"/>
                 <a:cs typeface="+mn-cs"/>
               </a:rPr>
-              <a:t>dezoito;</a:t>
+              <a:t>em termos de faturamento, aumentando incessantemente; </a:t>
             </a:r>
           </a:p>
           <a:p>
@@ -2297,79 +2195,7 @@
                 <a:ea typeface="+mn-ea"/>
                 <a:cs typeface="+mn-cs"/>
               </a:rPr>
-              <a:t>em </a:t>
-            </a:r>
-            <a:r>
-              <a:rPr lang="pt-BR" sz="1200" kern="1200" dirty="0" smtClean="0">
-                <a:solidFill>
-                  <a:schemeClr val="tx1"/>
-                </a:solidFill>
-                <a:effectLst/>
-                <a:latin typeface="+mn-lt"/>
-                <a:ea typeface="+mn-ea"/>
-                <a:cs typeface="+mn-cs"/>
-              </a:rPr>
-              <a:t>termos de faturamento, </a:t>
-            </a:r>
-            <a:r>
-              <a:rPr lang="pt-BR" sz="1200" kern="1200" dirty="0" smtClean="0">
-                <a:solidFill>
-                  <a:schemeClr val="tx1"/>
-                </a:solidFill>
-                <a:effectLst/>
-                <a:latin typeface="+mn-lt"/>
-                <a:ea typeface="+mn-ea"/>
-                <a:cs typeface="+mn-cs"/>
-              </a:rPr>
-              <a:t>aumentando incessantemente</a:t>
-            </a:r>
-            <a:r>
-              <a:rPr lang="pt-BR" sz="1200" kern="1200" dirty="0" smtClean="0">
-                <a:solidFill>
-                  <a:schemeClr val="tx1"/>
-                </a:solidFill>
-                <a:effectLst/>
-                <a:latin typeface="+mn-lt"/>
-                <a:ea typeface="+mn-ea"/>
-                <a:cs typeface="+mn-cs"/>
-              </a:rPr>
-              <a:t>; </a:t>
-            </a:r>
-            <a:endParaRPr lang="pt-BR" sz="1200" kern="1200" dirty="0" smtClean="0">
-              <a:solidFill>
-                <a:schemeClr val="tx1"/>
-              </a:solidFill>
-              <a:effectLst/>
-              <a:latin typeface="+mn-lt"/>
-              <a:ea typeface="+mn-ea"/>
-              <a:cs typeface="+mn-cs"/>
-            </a:endParaRPr>
-          </a:p>
-          <a:p>
-            <a:pPr lvl="0"/>
-            <a:r>
-              <a:rPr lang="pt-BR" sz="1200" kern="1200" dirty="0" smtClean="0">
-                <a:solidFill>
-                  <a:schemeClr val="tx1"/>
-                </a:solidFill>
-                <a:effectLst/>
-                <a:latin typeface="+mn-lt"/>
-                <a:ea typeface="+mn-ea"/>
-                <a:cs typeface="+mn-cs"/>
-              </a:rPr>
-              <a:t>e </a:t>
-            </a:r>
-            <a:r>
-              <a:rPr lang="pt-BR" sz="1200" kern="1200" dirty="0" smtClean="0">
-                <a:solidFill>
-                  <a:schemeClr val="tx1"/>
-                </a:solidFill>
-                <a:effectLst/>
-                <a:latin typeface="+mn-lt"/>
-                <a:ea typeface="+mn-ea"/>
-                <a:cs typeface="+mn-cs"/>
-              </a:rPr>
-              <a:t>relativo à investimentos, que mais que dobrou de dois mil e dezessete para dois mil e dezoito.</a:t>
+              <a:t>e relativo à investimentos, que mais que dobrou de dois mil e dezessete para dois mil e dezoito.</a:t>
             </a:r>
           </a:p>
           <a:p>
@@ -3090,43 +2916,7 @@
                 <a:ea typeface="+mn-ea"/>
                 <a:cs typeface="+mn-cs"/>
               </a:rPr>
-              <a:t>A </a:t>
-            </a:r>
-            <a:r>
-              <a:rPr lang="pt-BR" sz="1200" kern="1200" dirty="0" smtClean="0">
-                <a:solidFill>
-                  <a:schemeClr val="tx1"/>
-                </a:solidFill>
-                <a:effectLst/>
-                <a:latin typeface="+mn-lt"/>
-                <a:ea typeface="+mn-ea"/>
-                <a:cs typeface="+mn-cs"/>
-              </a:rPr>
-              <a:t>intenção </a:t>
-            </a:r>
-            <a:r>
-              <a:rPr lang="pt-BR" sz="1200" kern="1200" dirty="0" smtClean="0">
-                <a:solidFill>
-                  <a:schemeClr val="tx1"/>
-                </a:solidFill>
-                <a:effectLst/>
-                <a:latin typeface="+mn-lt"/>
-                <a:ea typeface="+mn-ea"/>
-                <a:cs typeface="+mn-cs"/>
-              </a:rPr>
-              <a:t>de contratação </a:t>
-            </a:r>
-            <a:r>
-              <a:rPr lang="pt-BR" sz="1200" kern="1200" dirty="0" smtClean="0">
-                <a:solidFill>
-                  <a:schemeClr val="tx1"/>
-                </a:solidFill>
-                <a:effectLst/>
-                <a:latin typeface="+mn-lt"/>
-                <a:ea typeface="+mn-ea"/>
-                <a:cs typeface="+mn-cs"/>
-              </a:rPr>
-              <a:t>rastreador para todos os entrevistados, de zero a dez, tem média sete</a:t>
+              <a:t>A intenção de contratação rastreador para todos os entrevistados, de zero a dez, tem média sete</a:t>
             </a:r>
             <a:r>
               <a:rPr lang="pt-BR" sz="1200" kern="1200" baseline="0" dirty="0" smtClean="0">
@@ -7097,7 +6887,6 @@
               <a:rPr lang="pt-BR" dirty="0" smtClean="0"/>
               <a:t> (comparativo)</a:t>
             </a:r>
-            <a:endParaRPr lang="pt-BR" dirty="0" smtClean="0"/>
           </a:p>
         </p:txBody>
       </p:sp>
@@ -7667,11 +7456,7 @@
             </a:br>
             <a:r>
               <a:rPr lang="pt-BR" sz="1600" dirty="0" smtClean="0"/>
-              <a:t>(Técnica</a:t>
-            </a:r>
-            <a:r>
-              <a:rPr lang="pt-BR" sz="1600" dirty="0" smtClean="0"/>
-              <a:t>)</a:t>
+              <a:t>(Técnica)</a:t>
             </a:r>
           </a:p>
           <a:p>

</xml_diff>